<commit_message>
Cleanup and tweak layout
</commit_message>
<xml_diff>
--- a/Poster/Election2012Poster.pptx
+++ b/Poster/Election2012Poster.pptx
@@ -109,7 +109,7 @@
   </p:defaultTextStyle>
   <p:extLst>
     <p:ext uri="{EFAFB233-063F-42B5-8137-9DF3F51BA10A}">
-      <p15:sldGuideLst xmlns="" xmlns:p15="http://schemas.microsoft.com/office/powerpoint/2012/main">
+      <p15:sldGuideLst xmlns:p15="http://schemas.microsoft.com/office/powerpoint/2012/main" xmlns="">
         <p15:guide id="1" orient="horz" pos="8064">
           <p15:clr>
             <a:srgbClr val="A4A3A4"/>
@@ -208,7 +208,7 @@
           <a:p>
             <a:fld id="{E3864992-0E3E-4687-ABD4-3B2927D0EAC5}" type="datetimeFigureOut">
               <a:rPr lang="en-US" smtClean="0"/>
-              <a:t>7/29/2013</a:t>
+              <a:t>7/30/2013</a:t>
             </a:fld>
             <a:endParaRPr lang="en-US"/>
           </a:p>
@@ -741,7 +741,7 @@
           <a:p>
             <a:fld id="{C6F99218-CF29-4270-A98A-29700F174958}" type="datetimeFigureOut">
               <a:rPr lang="en-US" smtClean="0"/>
-              <a:t>7/29/2013</a:t>
+              <a:t>7/30/2013</a:t>
             </a:fld>
             <a:endParaRPr lang="en-US"/>
           </a:p>
@@ -911,7 +911,7 @@
           <a:p>
             <a:fld id="{C6F99218-CF29-4270-A98A-29700F174958}" type="datetimeFigureOut">
               <a:rPr lang="en-US" smtClean="0"/>
-              <a:t>7/29/2013</a:t>
+              <a:t>7/30/2013</a:t>
             </a:fld>
             <a:endParaRPr lang="en-US"/>
           </a:p>
@@ -1091,7 +1091,7 @@
           <a:p>
             <a:fld id="{C6F99218-CF29-4270-A98A-29700F174958}" type="datetimeFigureOut">
               <a:rPr lang="en-US" smtClean="0"/>
-              <a:t>7/29/2013</a:t>
+              <a:t>7/30/2013</a:t>
             </a:fld>
             <a:endParaRPr lang="en-US"/>
           </a:p>
@@ -1261,7 +1261,7 @@
           <a:p>
             <a:fld id="{C6F99218-CF29-4270-A98A-29700F174958}" type="datetimeFigureOut">
               <a:rPr lang="en-US" smtClean="0"/>
-              <a:t>7/29/2013</a:t>
+              <a:t>7/30/2013</a:t>
             </a:fld>
             <a:endParaRPr lang="en-US"/>
           </a:p>
@@ -1507,7 +1507,7 @@
           <a:p>
             <a:fld id="{C6F99218-CF29-4270-A98A-29700F174958}" type="datetimeFigureOut">
               <a:rPr lang="en-US" smtClean="0"/>
-              <a:t>7/29/2013</a:t>
+              <a:t>7/30/2013</a:t>
             </a:fld>
             <a:endParaRPr lang="en-US"/>
           </a:p>
@@ -1795,7 +1795,7 @@
           <a:p>
             <a:fld id="{C6F99218-CF29-4270-A98A-29700F174958}" type="datetimeFigureOut">
               <a:rPr lang="en-US" smtClean="0"/>
-              <a:t>7/29/2013</a:t>
+              <a:t>7/30/2013</a:t>
             </a:fld>
             <a:endParaRPr lang="en-US"/>
           </a:p>
@@ -2217,7 +2217,7 @@
           <a:p>
             <a:fld id="{C6F99218-CF29-4270-A98A-29700F174958}" type="datetimeFigureOut">
               <a:rPr lang="en-US" smtClean="0"/>
-              <a:t>7/29/2013</a:t>
+              <a:t>7/30/2013</a:t>
             </a:fld>
             <a:endParaRPr lang="en-US"/>
           </a:p>
@@ -2335,7 +2335,7 @@
           <a:p>
             <a:fld id="{C6F99218-CF29-4270-A98A-29700F174958}" type="datetimeFigureOut">
               <a:rPr lang="en-US" smtClean="0"/>
-              <a:t>7/29/2013</a:t>
+              <a:t>7/30/2013</a:t>
             </a:fld>
             <a:endParaRPr lang="en-US"/>
           </a:p>
@@ -2430,7 +2430,7 @@
           <a:p>
             <a:fld id="{C6F99218-CF29-4270-A98A-29700F174958}" type="datetimeFigureOut">
               <a:rPr lang="en-US" smtClean="0"/>
-              <a:t>7/29/2013</a:t>
+              <a:t>7/30/2013</a:t>
             </a:fld>
             <a:endParaRPr lang="en-US"/>
           </a:p>
@@ -2707,7 +2707,7 @@
           <a:p>
             <a:fld id="{C6F99218-CF29-4270-A98A-29700F174958}" type="datetimeFigureOut">
               <a:rPr lang="en-US" smtClean="0"/>
-              <a:t>7/29/2013</a:t>
+              <a:t>7/30/2013</a:t>
             </a:fld>
             <a:endParaRPr lang="en-US"/>
           </a:p>
@@ -2960,7 +2960,7 @@
           <a:p>
             <a:fld id="{C6F99218-CF29-4270-A98A-29700F174958}" type="datetimeFigureOut">
               <a:rPr lang="en-US" smtClean="0"/>
-              <a:t>7/29/2013</a:t>
+              <a:t>7/30/2013</a:t>
             </a:fld>
             <a:endParaRPr lang="en-US"/>
           </a:p>
@@ -3173,7 +3173,7 @@
           <a:p>
             <a:fld id="{C6F99218-CF29-4270-A98A-29700F174958}" type="datetimeFigureOut">
               <a:rPr lang="en-US" smtClean="0"/>
-              <a:t>7/29/2013</a:t>
+              <a:t>7/30/2013</a:t>
             </a:fld>
             <a:endParaRPr lang="en-US"/>
           </a:p>
@@ -3556,195 +3556,8 @@
         </p:nvSpPr>
         <p:spPr>
           <a:xfrm>
-            <a:off x="15011400" y="3143752"/>
-            <a:ext cx="21793200" cy="21773648"/>
-          </a:xfrm>
-          <a:prstGeom prst="rect">
-            <a:avLst/>
-          </a:prstGeom>
-          <a:solidFill>
-            <a:srgbClr val="5D2884">
-              <a:alpha val="5098"/>
-            </a:srgbClr>
-          </a:solidFill>
-          <a:ln>
-            <a:solidFill>
-              <a:schemeClr val="accent4">
-                <a:lumMod val="20000"/>
-                <a:lumOff val="80000"/>
-              </a:schemeClr>
-            </a:solidFill>
-          </a:ln>
-        </p:spPr>
-        <p:style>
-          <a:lnRef idx="2">
-            <a:schemeClr val="accent4">
-              <a:shade val="50000"/>
-            </a:schemeClr>
-          </a:lnRef>
-          <a:fillRef idx="1">
-            <a:schemeClr val="accent4"/>
-          </a:fillRef>
-          <a:effectRef idx="0">
-            <a:schemeClr val="accent4"/>
-          </a:effectRef>
-          <a:fontRef idx="minor">
-            <a:schemeClr val="lt1"/>
-          </a:fontRef>
-        </p:style>
-        <p:txBody>
-          <a:bodyPr rtlCol="0" anchor="ctr"/>
-          <a:lstStyle/>
-          <a:p>
-            <a:pPr algn="ctr"/>
-            <a:endParaRPr lang="en-US" sz="5400" dirty="0"/>
-          </a:p>
-        </p:txBody>
-      </p:sp>
-      <p:sp>
-        <p:nvSpPr>
-          <p:cNvPr id="8" name="Rectangle 7"/>
-          <p:cNvSpPr/>
-          <p:nvPr/>
-        </p:nvSpPr>
-        <p:spPr>
-          <a:xfrm>
-            <a:off x="0" y="0"/>
-            <a:ext cx="51206400" cy="2674686"/>
-          </a:xfrm>
-          <a:prstGeom prst="rect">
-            <a:avLst/>
-          </a:prstGeom>
-          <a:solidFill>
-            <a:srgbClr val="5D2884"/>
-          </a:solidFill>
-          <a:ln>
-            <a:noFill/>
-          </a:ln>
-        </p:spPr>
-        <p:style>
-          <a:lnRef idx="2">
-            <a:schemeClr val="accent1">
-              <a:shade val="50000"/>
-            </a:schemeClr>
-          </a:lnRef>
-          <a:fillRef idx="1">
-            <a:schemeClr val="accent1"/>
-          </a:fillRef>
-          <a:effectRef idx="0">
-            <a:schemeClr val="accent1"/>
-          </a:effectRef>
-          <a:fontRef idx="minor">
-            <a:schemeClr val="lt1"/>
-          </a:fontRef>
-        </p:style>
-        <p:txBody>
-          <a:bodyPr rtlCol="0" anchor="ctr"/>
-          <a:lstStyle/>
-          <a:p>
-            <a:pPr algn="r"/>
-            <a:endParaRPr lang="en-US" dirty="0"/>
-          </a:p>
-        </p:txBody>
-      </p:sp>
-      <p:sp>
-        <p:nvSpPr>
-          <p:cNvPr id="32" name="Rectangle 31"/>
-          <p:cNvSpPr/>
-          <p:nvPr/>
-        </p:nvSpPr>
-        <p:spPr>
-          <a:xfrm>
-            <a:off x="15584067" y="18049434"/>
-            <a:ext cx="20842761" cy="6255899"/>
-          </a:xfrm>
-          <a:prstGeom prst="rect">
-            <a:avLst/>
-          </a:prstGeom>
-          <a:noFill/>
-          <a:ln>
-            <a:solidFill>
-              <a:schemeClr val="accent4"/>
-            </a:solidFill>
-          </a:ln>
-        </p:spPr>
-        <p:style>
-          <a:lnRef idx="3">
-            <a:schemeClr val="lt1"/>
-          </a:lnRef>
-          <a:fillRef idx="1">
-            <a:schemeClr val="accent4"/>
-          </a:fillRef>
-          <a:effectRef idx="1">
-            <a:schemeClr val="accent4"/>
-          </a:effectRef>
-          <a:fontRef idx="minor">
-            <a:schemeClr val="lt1"/>
-          </a:fontRef>
-        </p:style>
-        <p:txBody>
-          <a:bodyPr rtlCol="0" anchor="ctr"/>
-          <a:lstStyle/>
-          <a:p>
-            <a:pPr algn="ctr"/>
-            <a:endParaRPr lang="en-US" dirty="0"/>
-          </a:p>
-        </p:txBody>
-      </p:sp>
-      <p:sp>
-        <p:nvSpPr>
-          <p:cNvPr id="28" name="Rectangle 27"/>
-          <p:cNvSpPr/>
-          <p:nvPr/>
-        </p:nvSpPr>
-        <p:spPr>
-          <a:xfrm>
-            <a:off x="15504639" y="4724400"/>
-            <a:ext cx="20842761" cy="6342213"/>
-          </a:xfrm>
-          <a:prstGeom prst="rect">
-            <a:avLst/>
-          </a:prstGeom>
-          <a:noFill/>
-          <a:ln>
-            <a:solidFill>
-              <a:schemeClr val="accent4"/>
-            </a:solidFill>
-          </a:ln>
-        </p:spPr>
-        <p:style>
-          <a:lnRef idx="3">
-            <a:schemeClr val="lt1"/>
-          </a:lnRef>
-          <a:fillRef idx="1">
-            <a:schemeClr val="accent4"/>
-          </a:fillRef>
-          <a:effectRef idx="1">
-            <a:schemeClr val="accent4"/>
-          </a:effectRef>
-          <a:fontRef idx="minor">
-            <a:schemeClr val="lt1"/>
-          </a:fontRef>
-        </p:style>
-        <p:txBody>
-          <a:bodyPr rtlCol="0" anchor="ctr"/>
-          <a:lstStyle/>
-          <a:p>
-            <a:pPr algn="ctr"/>
-            <a:endParaRPr lang="en-US" dirty="0"/>
-          </a:p>
-        </p:txBody>
-      </p:sp>
-      <p:sp>
-        <p:nvSpPr>
-          <p:cNvPr id="43" name="Rectangle 42"/>
-          <p:cNvSpPr/>
-          <p:nvPr/>
-        </p:nvSpPr>
-        <p:spPr>
-          <a:xfrm>
-            <a:off x="37706469" y="2674686"/>
-            <a:ext cx="12418504" cy="22242714"/>
+            <a:off x="13210674" y="3622989"/>
+            <a:ext cx="24688800" cy="21773648"/>
           </a:xfrm>
           <a:prstGeom prst="rect">
             <a:avLst/>
@@ -3779,20 +3592,154 @@
           <a:lstStyle/>
           <a:p>
             <a:pPr algn="ctr"/>
-            <a:endParaRPr lang="en-US" dirty="0"/>
-          </a:p>
-        </p:txBody>
-      </p:sp>
-      <p:sp>
-        <p:nvSpPr>
-          <p:cNvPr id="10" name="Rectangle 9"/>
+            <a:endParaRPr lang="en-US" sz="5400" dirty="0"/>
+          </a:p>
+        </p:txBody>
+      </p:sp>
+      <p:sp>
+        <p:nvSpPr>
+          <p:cNvPr id="8" name="Rectangle 7"/>
           <p:cNvSpPr/>
           <p:nvPr/>
         </p:nvSpPr>
         <p:spPr>
           <a:xfrm>
-            <a:off x="972240" y="4481095"/>
-            <a:ext cx="13458215" cy="21100068"/>
+            <a:off x="0" y="-1"/>
+            <a:ext cx="51206400" cy="3365815"/>
+          </a:xfrm>
+          <a:prstGeom prst="rect">
+            <a:avLst/>
+          </a:prstGeom>
+          <a:solidFill>
+            <a:srgbClr val="5D2884"/>
+          </a:solidFill>
+          <a:ln>
+            <a:noFill/>
+          </a:ln>
+        </p:spPr>
+        <p:style>
+          <a:lnRef idx="2">
+            <a:schemeClr val="accent1">
+              <a:shade val="50000"/>
+            </a:schemeClr>
+          </a:lnRef>
+          <a:fillRef idx="1">
+            <a:schemeClr val="accent1"/>
+          </a:fillRef>
+          <a:effectRef idx="0">
+            <a:schemeClr val="accent1"/>
+          </a:effectRef>
+          <a:fontRef idx="minor">
+            <a:schemeClr val="lt1"/>
+          </a:fontRef>
+        </p:style>
+        <p:txBody>
+          <a:bodyPr rtlCol="0" anchor="ctr"/>
+          <a:lstStyle/>
+          <a:p>
+            <a:pPr algn="r"/>
+            <a:endParaRPr lang="en-US" dirty="0"/>
+          </a:p>
+        </p:txBody>
+      </p:sp>
+      <p:sp>
+        <p:nvSpPr>
+          <p:cNvPr id="32" name="Rectangle 31"/>
+          <p:cNvSpPr/>
+          <p:nvPr/>
+        </p:nvSpPr>
+        <p:spPr>
+          <a:xfrm>
+            <a:off x="13801481" y="19107934"/>
+            <a:ext cx="23716993" cy="5869140"/>
+          </a:xfrm>
+          <a:prstGeom prst="rect">
+            <a:avLst/>
+          </a:prstGeom>
+          <a:noFill/>
+          <a:ln>
+            <a:solidFill>
+              <a:schemeClr val="accent4"/>
+            </a:solidFill>
+          </a:ln>
+        </p:spPr>
+        <p:style>
+          <a:lnRef idx="3">
+            <a:schemeClr val="lt1"/>
+          </a:lnRef>
+          <a:fillRef idx="1">
+            <a:schemeClr val="accent4"/>
+          </a:fillRef>
+          <a:effectRef idx="1">
+            <a:schemeClr val="accent4"/>
+          </a:effectRef>
+          <a:fontRef idx="minor">
+            <a:schemeClr val="lt1"/>
+          </a:fontRef>
+        </p:style>
+        <p:txBody>
+          <a:bodyPr rtlCol="0" anchor="ctr"/>
+          <a:lstStyle/>
+          <a:p>
+            <a:pPr algn="ctr"/>
+            <a:endParaRPr lang="en-US" dirty="0"/>
+          </a:p>
+        </p:txBody>
+      </p:sp>
+      <p:sp>
+        <p:nvSpPr>
+          <p:cNvPr id="28" name="Rectangle 27"/>
+          <p:cNvSpPr/>
+          <p:nvPr/>
+        </p:nvSpPr>
+        <p:spPr>
+          <a:xfrm>
+            <a:off x="13801481" y="5203638"/>
+            <a:ext cx="23716993" cy="5997762"/>
+          </a:xfrm>
+          <a:prstGeom prst="rect">
+            <a:avLst/>
+          </a:prstGeom>
+          <a:noFill/>
+          <a:ln>
+            <a:solidFill>
+              <a:schemeClr val="accent4"/>
+            </a:solidFill>
+          </a:ln>
+        </p:spPr>
+        <p:style>
+          <a:lnRef idx="3">
+            <a:schemeClr val="lt1"/>
+          </a:lnRef>
+          <a:fillRef idx="1">
+            <a:schemeClr val="accent4"/>
+          </a:fillRef>
+          <a:effectRef idx="1">
+            <a:schemeClr val="accent4"/>
+          </a:effectRef>
+          <a:fontRef idx="minor">
+            <a:schemeClr val="lt1"/>
+          </a:fontRef>
+        </p:style>
+        <p:txBody>
+          <a:bodyPr rtlCol="0" anchor="ctr"/>
+          <a:lstStyle/>
+          <a:p>
+            <a:pPr algn="ctr"/>
+            <a:endParaRPr lang="en-US" dirty="0"/>
+          </a:p>
+        </p:txBody>
+      </p:sp>
+      <p:sp>
+        <p:nvSpPr>
+          <p:cNvPr id="43" name="Rectangle 42"/>
+          <p:cNvSpPr/>
+          <p:nvPr/>
+        </p:nvSpPr>
+        <p:spPr>
+          <a:xfrm>
+            <a:off x="38261544" y="3646885"/>
+            <a:ext cx="12563856" cy="21749751"/>
           </a:xfrm>
           <a:prstGeom prst="rect">
             <a:avLst/>
@@ -3826,6 +3773,54 @@
           <a:bodyPr rtlCol="0" anchor="ctr"/>
           <a:lstStyle/>
           <a:p>
+            <a:pPr algn="ctr"/>
+            <a:endParaRPr lang="en-US" dirty="0"/>
+          </a:p>
+        </p:txBody>
+      </p:sp>
+      <p:sp>
+        <p:nvSpPr>
+          <p:cNvPr id="10" name="Rectangle 9"/>
+          <p:cNvSpPr/>
+          <p:nvPr/>
+        </p:nvSpPr>
+        <p:spPr>
+          <a:xfrm>
+            <a:off x="366226" y="3646886"/>
+            <a:ext cx="12508713" cy="21749751"/>
+          </a:xfrm>
+          <a:prstGeom prst="rect">
+            <a:avLst/>
+          </a:prstGeom>
+          <a:solidFill>
+            <a:srgbClr val="5D2884">
+              <a:alpha val="5098"/>
+            </a:srgbClr>
+          </a:solidFill>
+          <a:ln>
+            <a:noFill/>
+          </a:ln>
+        </p:spPr>
+        <p:style>
+          <a:lnRef idx="2">
+            <a:schemeClr val="accent4">
+              <a:shade val="50000"/>
+            </a:schemeClr>
+          </a:lnRef>
+          <a:fillRef idx="1">
+            <a:schemeClr val="accent4"/>
+          </a:fillRef>
+          <a:effectRef idx="0">
+            <a:schemeClr val="accent4"/>
+          </a:effectRef>
+          <a:fontRef idx="minor">
+            <a:schemeClr val="lt1"/>
+          </a:fontRef>
+        </p:style>
+        <p:txBody>
+          <a:bodyPr rtlCol="0" anchor="ctr"/>
+          <a:lstStyle/>
+          <a:p>
             <a:endParaRPr lang="en-US" sz="8800" dirty="0">
               <a:latin typeface="Rockwell" pitchFamily="18" charset="0"/>
             </a:endParaRPr>
@@ -3920,7 +3915,7 @@
         </p:blipFill>
         <p:spPr>
           <a:xfrm>
-            <a:off x="39010925" y="4724400"/>
+            <a:off x="39754555" y="5203637"/>
             <a:ext cx="9577834" cy="6385223"/>
           </a:xfrm>
           <a:prstGeom prst="rect">
@@ -3950,8 +3945,8 @@
         </p:blipFill>
         <p:spPr>
           <a:xfrm>
-            <a:off x="26365200" y="26489025"/>
-            <a:ext cx="3796831" cy="3301592"/>
+            <a:off x="31070956" y="12433730"/>
+            <a:ext cx="6245853" cy="5431176"/>
           </a:xfrm>
           <a:prstGeom prst="rect">
             <a:avLst/>
@@ -3980,8 +3975,8 @@
         </p:blipFill>
         <p:spPr>
           <a:xfrm>
-            <a:off x="27572628" y="4978878"/>
-            <a:ext cx="8647983" cy="5765322"/>
+            <a:off x="28936830" y="5434052"/>
+            <a:ext cx="8353044" cy="5568696"/>
           </a:xfrm>
           <a:prstGeom prst="rect">
             <a:avLst/>
@@ -4010,8 +4005,8 @@
         </p:blipFill>
         <p:spPr>
           <a:xfrm>
-            <a:off x="27753602" y="18263105"/>
-            <a:ext cx="8593798" cy="5729199"/>
+            <a:off x="28936830" y="19258156"/>
+            <a:ext cx="8353044" cy="5568696"/>
           </a:xfrm>
           <a:prstGeom prst="rect">
             <a:avLst/>
@@ -4041,7 +4036,7 @@
         </p:blipFill>
         <p:spPr bwMode="auto">
           <a:xfrm>
-            <a:off x="31562845" y="26102078"/>
+            <a:off x="31654285" y="26102078"/>
             <a:ext cx="4431413" cy="4049614"/>
           </a:xfrm>
           <a:prstGeom prst="rect">
@@ -4082,7 +4077,7 @@
         </p:blipFill>
         <p:spPr bwMode="auto">
           <a:xfrm>
-            <a:off x="20317836" y="26102078"/>
+            <a:off x="20409276" y="26102078"/>
             <a:ext cx="4459723" cy="4075485"/>
           </a:xfrm>
           <a:prstGeom prst="rect">
@@ -4100,185 +4095,16 @@
           </a:extLst>
         </p:spPr>
       </p:pic>
-      <p:grpSp>
-        <p:nvGrpSpPr>
-          <p:cNvPr id="15" name="Group 14"/>
-          <p:cNvGrpSpPr/>
-          <p:nvPr/>
-        </p:nvGrpSpPr>
-        <p:grpSpPr>
-          <a:xfrm>
-            <a:off x="1429007" y="10182900"/>
-            <a:ext cx="12420600" cy="5935912"/>
-            <a:chOff x="1371600" y="4929758"/>
-            <a:chExt cx="10302822" cy="5935912"/>
-          </a:xfrm>
-        </p:grpSpPr>
-        <p:sp>
-          <p:nvSpPr>
-            <p:cNvPr id="3" name="Rectangle 2"/>
-            <p:cNvSpPr/>
-            <p:nvPr/>
-          </p:nvSpPr>
-          <p:spPr>
-            <a:xfrm>
-              <a:off x="1371600" y="4929758"/>
-              <a:ext cx="10302822" cy="5935912"/>
-            </a:xfrm>
-            <a:prstGeom prst="rect">
-              <a:avLst/>
-            </a:prstGeom>
-            <a:noFill/>
-            <a:ln>
-              <a:solidFill>
-                <a:srgbClr val="5D2884"/>
-              </a:solidFill>
-            </a:ln>
-          </p:spPr>
-          <p:style>
-            <a:lnRef idx="3">
-              <a:schemeClr val="lt1"/>
-            </a:lnRef>
-            <a:fillRef idx="1">
-              <a:schemeClr val="accent4"/>
-            </a:fillRef>
-            <a:effectRef idx="1">
-              <a:schemeClr val="accent4"/>
-            </a:effectRef>
-            <a:fontRef idx="minor">
-              <a:schemeClr val="lt1"/>
-            </a:fontRef>
-          </p:style>
-          <p:txBody>
-            <a:bodyPr rtlCol="0" anchor="ctr"/>
-            <a:lstStyle/>
-            <a:p>
-              <a:pPr algn="ctr"/>
-              <a:endParaRPr lang="en-US" dirty="0"/>
-            </a:p>
-          </p:txBody>
-        </p:sp>
-        <p:pic>
-          <p:nvPicPr>
-            <p:cNvPr id="25" name="Picture 24"/>
-            <p:cNvPicPr>
-              <a:picLocks noChangeAspect="1"/>
-            </p:cNvPicPr>
-            <p:nvPr/>
-          </p:nvPicPr>
-          <p:blipFill>
-            <a:blip r:embed="rId9" cstate="print">
-              <a:extLst>
-                <a:ext uri="{28A0092B-C50C-407E-A947-70E740481C1C}">
-                  <a14:useLocalDpi xmlns:a14="http://schemas.microsoft.com/office/drawing/2010/main" val="0"/>
-                </a:ext>
-              </a:extLst>
-            </a:blip>
-            <a:stretch>
-              <a:fillRect/>
-            </a:stretch>
-          </p:blipFill>
-          <p:spPr>
-            <a:xfrm>
-              <a:off x="4037435" y="7533253"/>
-              <a:ext cx="4678933" cy="3119288"/>
-            </a:xfrm>
-            <a:prstGeom prst="rect">
-              <a:avLst/>
-            </a:prstGeom>
-          </p:spPr>
-        </p:pic>
-        <p:sp>
-          <p:nvSpPr>
-            <p:cNvPr id="2" name="TextBox 1"/>
-            <p:cNvSpPr txBox="1"/>
-            <p:nvPr/>
-          </p:nvSpPr>
-          <p:spPr>
-            <a:xfrm>
-              <a:off x="1534021" y="4982474"/>
-              <a:ext cx="3083799" cy="830997"/>
-            </a:xfrm>
-            <a:prstGeom prst="rect">
-              <a:avLst/>
-            </a:prstGeom>
-            <a:noFill/>
-          </p:spPr>
-          <p:txBody>
-            <a:bodyPr wrap="none" rtlCol="0">
-              <a:spAutoFit/>
-            </a:bodyPr>
-            <a:lstStyle/>
-            <a:p>
-              <a:r>
-                <a:rPr lang="en-US" sz="4800" dirty="0" smtClean="0">
-                  <a:solidFill>
-                    <a:srgbClr val="7030A0"/>
-                  </a:solidFill>
-                  <a:latin typeface="Rockwell" pitchFamily="18" charset="0"/>
-                </a:rPr>
-                <a:t>Swing States</a:t>
-              </a:r>
-              <a:endParaRPr lang="en-US" sz="4800" dirty="0">
-                <a:solidFill>
-                  <a:srgbClr val="7030A0"/>
-                </a:solidFill>
-                <a:latin typeface="Rockwell" pitchFamily="18" charset="0"/>
-              </a:endParaRPr>
-            </a:p>
-          </p:txBody>
-        </p:sp>
-        <p:sp>
-          <p:nvSpPr>
-            <p:cNvPr id="5" name="TextBox 4"/>
-            <p:cNvSpPr txBox="1"/>
-            <p:nvPr/>
-          </p:nvSpPr>
-          <p:spPr>
-            <a:xfrm>
-              <a:off x="1534021" y="5813471"/>
-              <a:ext cx="9944448" cy="1569660"/>
-            </a:xfrm>
-            <a:prstGeom prst="rect">
-              <a:avLst/>
-            </a:prstGeom>
-            <a:noFill/>
-          </p:spPr>
-          <p:txBody>
-            <a:bodyPr wrap="square" rtlCol="0">
-              <a:spAutoFit/>
-            </a:bodyPr>
-            <a:lstStyle/>
-            <a:p>
-              <a:r>
-                <a:rPr lang="en-US" sz="3200" dirty="0" smtClean="0">
-                  <a:latin typeface="Rockwell" pitchFamily="18" charset="0"/>
-                </a:rPr>
-                <a:t>Our spending analysis focuses on the country as a whole, as well as several swing states from the 2012 Election.  The swing states are highlighted in </a:t>
-              </a:r>
-              <a:r>
-                <a:rPr lang="en-US" sz="3200" dirty="0" smtClean="0">
-                  <a:latin typeface="Rockwell" pitchFamily="18" charset="0"/>
-                </a:rPr>
-                <a:t>yellow in the map below.</a:t>
-              </a:r>
-              <a:endParaRPr lang="en-US" sz="3200" dirty="0">
-                <a:latin typeface="Rockwell" pitchFamily="18" charset="0"/>
-              </a:endParaRPr>
-            </a:p>
-          </p:txBody>
-        </p:sp>
-      </p:grpSp>
-      <p:sp>
-        <p:nvSpPr>
-          <p:cNvPr id="33" name="Rectangle 32"/>
+      <p:sp>
+        <p:nvSpPr>
+          <p:cNvPr id="3" name="Rectangle 2"/>
           <p:cNvSpPr/>
           <p:nvPr/>
         </p:nvSpPr>
         <p:spPr>
           <a:xfrm>
-            <a:off x="1400432" y="16238309"/>
-            <a:ext cx="12420600" cy="8464803"/>
+            <a:off x="808705" y="9372423"/>
+            <a:ext cx="11563928" cy="4371299"/>
           </a:xfrm>
           <a:prstGeom prst="rect">
             <a:avLst/>
@@ -4286,7 +4112,7 @@
           <a:noFill/>
           <a:ln>
             <a:solidFill>
-              <a:srgbClr val="5D2884"/>
+              <a:schemeClr val="accent4"/>
             </a:solidFill>
           </a:ln>
         </p:spPr>
@@ -4313,6 +4139,154 @@
           </a:p>
         </p:txBody>
       </p:sp>
+      <p:pic>
+        <p:nvPicPr>
+          <p:cNvPr id="25" name="Picture 24"/>
+          <p:cNvPicPr>
+            <a:picLocks noChangeAspect="1"/>
+          </p:cNvPicPr>
+          <p:nvPr/>
+        </p:nvPicPr>
+        <p:blipFill>
+          <a:blip r:embed="rId9" cstate="print">
+            <a:extLst>
+              <a:ext uri="{28A0092B-C50C-407E-A947-70E740481C1C}">
+                <a14:useLocalDpi xmlns:a14="http://schemas.microsoft.com/office/drawing/2010/main" val="0"/>
+              </a:ext>
+            </a:extLst>
+          </a:blip>
+          <a:stretch>
+            <a:fillRect/>
+          </a:stretch>
+        </p:blipFill>
+        <p:spPr>
+          <a:xfrm>
+            <a:off x="1004512" y="10289989"/>
+            <a:ext cx="5640703" cy="3119288"/>
+          </a:xfrm>
+          <a:prstGeom prst="rect">
+            <a:avLst/>
+          </a:prstGeom>
+        </p:spPr>
+      </p:pic>
+      <p:sp>
+        <p:nvSpPr>
+          <p:cNvPr id="2" name="TextBox 1"/>
+          <p:cNvSpPr txBox="1"/>
+          <p:nvPr/>
+        </p:nvSpPr>
+        <p:spPr>
+          <a:xfrm>
+            <a:off x="1004512" y="9473265"/>
+            <a:ext cx="3717684" cy="830997"/>
+          </a:xfrm>
+          <a:prstGeom prst="rect">
+            <a:avLst/>
+          </a:prstGeom>
+          <a:noFill/>
+        </p:spPr>
+        <p:txBody>
+          <a:bodyPr wrap="none" rtlCol="0">
+            <a:spAutoFit/>
+          </a:bodyPr>
+          <a:lstStyle/>
+          <a:p>
+            <a:r>
+              <a:rPr lang="en-US" sz="4800" dirty="0" smtClean="0">
+                <a:solidFill>
+                  <a:srgbClr val="7030A0"/>
+                </a:solidFill>
+                <a:latin typeface="Rockwell" pitchFamily="18" charset="0"/>
+              </a:rPr>
+              <a:t>Swing States</a:t>
+            </a:r>
+            <a:endParaRPr lang="en-US" sz="4800" dirty="0">
+              <a:solidFill>
+                <a:srgbClr val="7030A0"/>
+              </a:solidFill>
+              <a:latin typeface="Rockwell" pitchFamily="18" charset="0"/>
+            </a:endParaRPr>
+          </a:p>
+        </p:txBody>
+      </p:sp>
+      <p:sp>
+        <p:nvSpPr>
+          <p:cNvPr id="5" name="TextBox 4"/>
+          <p:cNvSpPr txBox="1"/>
+          <p:nvPr/>
+        </p:nvSpPr>
+        <p:spPr>
+          <a:xfrm>
+            <a:off x="6998792" y="10111758"/>
+            <a:ext cx="5373841" cy="3539430"/>
+          </a:xfrm>
+          <a:prstGeom prst="rect">
+            <a:avLst/>
+          </a:prstGeom>
+          <a:noFill/>
+        </p:spPr>
+        <p:txBody>
+          <a:bodyPr wrap="square" rtlCol="0">
+            <a:spAutoFit/>
+          </a:bodyPr>
+          <a:lstStyle/>
+          <a:p>
+            <a:r>
+              <a:rPr lang="en-US" sz="3200" dirty="0" smtClean="0">
+                <a:latin typeface="Rockwell" pitchFamily="18" charset="0"/>
+              </a:rPr>
+              <a:t>Our spending analysis focuses on the country as a whole, as well as several swing states from the 2012 Election.  The swing states are highlighted in yellow in the map below.</a:t>
+            </a:r>
+            <a:endParaRPr lang="en-US" sz="3200" dirty="0">
+              <a:latin typeface="Rockwell" pitchFamily="18" charset="0"/>
+            </a:endParaRPr>
+          </a:p>
+        </p:txBody>
+      </p:sp>
+      <p:sp>
+        <p:nvSpPr>
+          <p:cNvPr id="33" name="Rectangle 32"/>
+          <p:cNvSpPr/>
+          <p:nvPr/>
+        </p:nvSpPr>
+        <p:spPr>
+          <a:xfrm>
+            <a:off x="808705" y="14020800"/>
+            <a:ext cx="11563928" cy="7973278"/>
+          </a:xfrm>
+          <a:prstGeom prst="rect">
+            <a:avLst/>
+          </a:prstGeom>
+          <a:noFill/>
+          <a:ln>
+            <a:solidFill>
+              <a:schemeClr val="accent4"/>
+            </a:solidFill>
+          </a:ln>
+        </p:spPr>
+        <p:style>
+          <a:lnRef idx="3">
+            <a:schemeClr val="lt1"/>
+          </a:lnRef>
+          <a:fillRef idx="1">
+            <a:schemeClr val="accent4"/>
+          </a:fillRef>
+          <a:effectRef idx="1">
+            <a:schemeClr val="accent4"/>
+          </a:effectRef>
+          <a:fontRef idx="minor">
+            <a:schemeClr val="lt1"/>
+          </a:fontRef>
+        </p:style>
+        <p:txBody>
+          <a:bodyPr rtlCol="0" anchor="ctr"/>
+          <a:lstStyle/>
+          <a:p>
+            <a:pPr algn="ctr"/>
+            <a:endParaRPr lang="en-US" dirty="0"/>
+          </a:p>
+        </p:txBody>
+      </p:sp>
       <p:sp>
         <p:nvSpPr>
           <p:cNvPr id="35" name="TextBox 34"/>
@@ -4321,7 +4295,7 @@
         </p:nvSpPr>
         <p:spPr>
           <a:xfrm>
-            <a:off x="1682295" y="16298935"/>
+            <a:off x="1004512" y="14068926"/>
             <a:ext cx="2365648" cy="830997"/>
           </a:xfrm>
           <a:prstGeom prst="rect">
@@ -4362,7 +4336,7 @@
         </p:nvSpPr>
         <p:spPr>
           <a:xfrm>
-            <a:off x="1624814" y="17185887"/>
+            <a:off x="1004512" y="14842613"/>
             <a:ext cx="11870428" cy="1077218"/>
           </a:xfrm>
           <a:prstGeom prst="rect">
@@ -4388,9 +4362,6 @@
               </a:rPr>
               <a:t>:</a:t>
             </a:r>
-            <a:endParaRPr lang="en-US" sz="3200" dirty="0" smtClean="0">
-              <a:latin typeface="Rockwell" pitchFamily="18" charset="0"/>
-            </a:endParaRPr>
           </a:p>
         </p:txBody>
       </p:sp>
@@ -4416,7 +4387,7 @@
         </p:blipFill>
         <p:spPr>
           <a:xfrm>
-            <a:off x="9601200" y="21517010"/>
+            <a:off x="8995186" y="19173736"/>
             <a:ext cx="2802954" cy="2437352"/>
           </a:xfrm>
           <a:prstGeom prst="rect">
@@ -4446,7 +4417,7 @@
         </p:blipFill>
         <p:spPr>
           <a:xfrm>
-            <a:off x="9601200" y="18909934"/>
+            <a:off x="8995186" y="16566660"/>
             <a:ext cx="2802954" cy="2437352"/>
           </a:xfrm>
           <a:prstGeom prst="rect">
@@ -4462,8 +4433,8 @@
         </p:nvSpPr>
         <p:spPr>
           <a:xfrm flipH="1">
-            <a:off x="37770774" y="19904128"/>
-            <a:ext cx="12239368" cy="4401205"/>
+            <a:off x="38782752" y="20190861"/>
+            <a:ext cx="11521440" cy="3046988"/>
           </a:xfrm>
           <a:prstGeom prst="rect">
             <a:avLst/>
@@ -4481,26 +4452,23 @@
           <a:p>
             <a:pPr algn="just"/>
             <a:r>
-              <a:rPr lang="en-US" sz="4000" dirty="0">
+              <a:rPr lang="en-US" sz="3200" dirty="0">
                 <a:latin typeface="Rockwell" pitchFamily="18" charset="0"/>
               </a:rPr>
               <a:t>Ultimately, our ﬁndings </a:t>
             </a:r>
             <a:r>
-              <a:rPr lang="en-US" sz="4000" dirty="0" smtClean="0">
+              <a:rPr lang="en-US" sz="3200" dirty="0" smtClean="0">
                 <a:latin typeface="Rockwell" pitchFamily="18" charset="0"/>
               </a:rPr>
               <a:t>suggest that it </a:t>
             </a:r>
             <a:r>
-              <a:rPr lang="en-US" sz="4000" dirty="0">
+              <a:rPr lang="en-US" sz="3200" dirty="0">
                 <a:latin typeface="Rockwell" pitchFamily="18" charset="0"/>
               </a:rPr>
               <a:t>is not clear whether the existence of Super PACs had a measurable impact on the outcome of the presidential race. Instead, the events that garnered large amounts of media coverage, such as the 47% video and the ﬁrst presidential debate, seem to have had the most noticeable eﬀect on the polling.</a:t>
             </a:r>
-            <a:endParaRPr lang="en-US" sz="4000" dirty="0">
-              <a:latin typeface="Rockwell" pitchFamily="18" charset="0"/>
-            </a:endParaRPr>
           </a:p>
         </p:txBody>
       </p:sp>
@@ -4513,7 +4481,7 @@
         <p:spPr>
           <a:xfrm>
             <a:off x="17063013" y="1423815"/>
-            <a:ext cx="17639444" cy="923330"/>
+            <a:ext cx="17639444" cy="1754326"/>
           </a:xfrm>
           <a:prstGeom prst="rect">
             <a:avLst/>
@@ -4534,16 +4502,7 @@
                 </a:solidFill>
                 <a:latin typeface="Rockwell" pitchFamily="18" charset="0"/>
               </a:rPr>
-              <a:t>Eric Hare, </a:t>
-            </a:r>
-            <a:r>
-              <a:rPr lang="en-US" sz="5400" dirty="0" err="1" smtClean="0">
-                <a:solidFill>
-                  <a:schemeClr val="bg1"/>
-                </a:solidFill>
-                <a:latin typeface="Rockwell" pitchFamily="18" charset="0"/>
-              </a:rPr>
-              <a:t>Andee</a:t>
+              <a:t>Eric Hare, Andee Kaplan, Heike Hofmann, Dianne </a:t>
             </a:r>
             <a:r>
               <a:rPr lang="en-US" sz="5400" dirty="0" smtClean="0">
@@ -4552,7 +4511,19 @@
                 </a:solidFill>
                 <a:latin typeface="Rockwell" pitchFamily="18" charset="0"/>
               </a:rPr>
-              <a:t> Kaplan, Heike Hofmann, Dianne Cook</a:t>
+              <a:t>Cook</a:t>
+            </a:r>
+          </a:p>
+          <a:p>
+            <a:pPr algn="ctr"/>
+            <a:r>
+              <a:rPr lang="en-US" sz="5400" dirty="0" smtClean="0">
+                <a:solidFill>
+                  <a:schemeClr val="bg1"/>
+                </a:solidFill>
+                <a:latin typeface="Rockwell" pitchFamily="18" charset="0"/>
+              </a:rPr>
+              <a:t>Department of Statistics, Iowa State University</a:t>
             </a:r>
             <a:endParaRPr lang="en-US" sz="5400" dirty="0">
               <a:solidFill>
@@ -4571,8 +4542,8 @@
         </p:nvSpPr>
         <p:spPr>
           <a:xfrm>
-            <a:off x="928991" y="3115178"/>
-            <a:ext cx="13458215" cy="1337343"/>
+            <a:off x="322977" y="3594415"/>
+            <a:ext cx="12548910" cy="1337343"/>
           </a:xfrm>
           <a:prstGeom prst="rect">
             <a:avLst/>
@@ -4581,9 +4552,7 @@
             <a:srgbClr val="5D2884"/>
           </a:solidFill>
           <a:ln>
-            <a:solidFill>
-              <a:schemeClr val="bg1"/>
-            </a:solidFill>
+            <a:noFill/>
           </a:ln>
         </p:spPr>
         <p:style>
@@ -4627,8 +4596,8 @@
         </p:nvSpPr>
         <p:spPr>
           <a:xfrm>
-            <a:off x="15011400" y="3143752"/>
-            <a:ext cx="21793200" cy="1337343"/>
+            <a:off x="13210674" y="3594415"/>
+            <a:ext cx="24688800" cy="1337343"/>
           </a:xfrm>
           <a:prstGeom prst="rect">
             <a:avLst/>
@@ -4637,9 +4606,7 @@
             <a:srgbClr val="5D2884"/>
           </a:solidFill>
           <a:ln>
-            <a:solidFill>
-              <a:schemeClr val="bg1"/>
-            </a:solidFill>
+            <a:noFill/>
           </a:ln>
         </p:spPr>
         <p:style>
@@ -4683,8 +4650,8 @@
         </p:nvSpPr>
         <p:spPr>
           <a:xfrm>
-            <a:off x="37627369" y="3167649"/>
-            <a:ext cx="12526179" cy="1337343"/>
+            <a:off x="38261544" y="3594415"/>
+            <a:ext cx="12563856" cy="1337343"/>
           </a:xfrm>
           <a:prstGeom prst="rect">
             <a:avLst/>
@@ -4693,9 +4660,7 @@
             <a:srgbClr val="5D2884"/>
           </a:solidFill>
           <a:ln>
-            <a:solidFill>
-              <a:schemeClr val="bg1"/>
-            </a:solidFill>
+            <a:noFill/>
           </a:ln>
         </p:spPr>
         <p:style>
@@ -4739,8 +4704,8 @@
         </p:nvSpPr>
         <p:spPr>
           <a:xfrm>
-            <a:off x="37805562" y="18113873"/>
-            <a:ext cx="12373779" cy="1337343"/>
+            <a:off x="38261544" y="18593110"/>
+            <a:ext cx="12563856" cy="1337343"/>
           </a:xfrm>
           <a:prstGeom prst="rect">
             <a:avLst/>
@@ -4749,9 +4714,7 @@
             <a:srgbClr val="5D2884"/>
           </a:solidFill>
           <a:ln>
-            <a:solidFill>
-              <a:schemeClr val="bg1"/>
-            </a:solidFill>
+            <a:noFill/>
           </a:ln>
         </p:spPr>
         <p:style>
@@ -4795,8 +4758,8 @@
         </p:nvSpPr>
         <p:spPr>
           <a:xfrm flipH="1">
-            <a:off x="1520238" y="4815279"/>
-            <a:ext cx="12239368" cy="3170099"/>
+            <a:off x="851193" y="5105400"/>
+            <a:ext cx="11521440" cy="2554545"/>
           </a:xfrm>
           <a:prstGeom prst="rect">
             <a:avLst/>
@@ -4814,12 +4777,12 @@
           <a:p>
             <a:pPr algn="just"/>
             <a:r>
-              <a:rPr lang="en-US" sz="4000" dirty="0" smtClean="0">
+              <a:rPr lang="en-US" sz="3200" dirty="0" smtClean="0">
                 <a:latin typeface="Rockwell" pitchFamily="18" charset="0"/>
               </a:rPr>
               <a:t>The 2010 Citizens United ruling ushered in a new era of election campaign spending by allowing Super PACs to spend an almost limitless amount.  What was the nature of this spending, and how did it impact the results of the election?</a:t>
             </a:r>
-            <a:endParaRPr lang="en-US" sz="4000" dirty="0">
+            <a:endParaRPr lang="en-US" sz="3200" dirty="0">
               <a:latin typeface="Rockwell" pitchFamily="18" charset="0"/>
             </a:endParaRPr>
           </a:p>
@@ -4833,8 +4796,8 @@
         </p:nvSpPr>
         <p:spPr>
           <a:xfrm>
-            <a:off x="910814" y="8610599"/>
-            <a:ext cx="13458215" cy="1337343"/>
+            <a:off x="366226" y="7800122"/>
+            <a:ext cx="12504379" cy="1337343"/>
           </a:xfrm>
           <a:prstGeom prst="rect">
             <a:avLst/>
@@ -4843,9 +4806,7 @@
             <a:srgbClr val="5D2884"/>
           </a:solidFill>
           <a:ln>
-            <a:solidFill>
-              <a:schemeClr val="bg1"/>
-            </a:solidFill>
+            <a:noFill/>
           </a:ln>
         </p:spPr>
         <p:style>
@@ -4889,7 +4850,7 @@
         </p:nvSpPr>
         <p:spPr>
           <a:xfrm>
-            <a:off x="1682295" y="18909934"/>
+            <a:off x="10821031" y="26180567"/>
             <a:ext cx="6057152" cy="5632311"/>
           </a:xfrm>
           <a:prstGeom prst="rect">
@@ -5010,10 +4971,10 @@
               <a:t>Expenditures related to the ongoing cost of running an Super PAC, including salary, rent, consultants, fundraising, and </a:t>
             </a:r>
             <a:r>
-              <a:rPr lang="en-US" sz="2400" dirty="0" err="1">
-                <a:latin typeface="Rockwell" pitchFamily="18" charset="0"/>
-              </a:rPr>
-              <a:t>trave</a:t>
+              <a:rPr lang="en-US" sz="2400" dirty="0" smtClean="0">
+                <a:latin typeface="Rockwell" pitchFamily="18" charset="0"/>
+              </a:rPr>
+              <a:t>travel</a:t>
             </a:r>
             <a:endParaRPr lang="en-US" sz="2400" dirty="0">
               <a:latin typeface="Rockwell" pitchFamily="18" charset="0"/>
@@ -5093,8 +5054,8 @@
         </p:nvSpPr>
         <p:spPr>
           <a:xfrm>
-            <a:off x="15584067" y="4707046"/>
-            <a:ext cx="11988561" cy="6740307"/>
+            <a:off x="14068926" y="5282535"/>
+            <a:ext cx="14610348" cy="5693866"/>
           </a:xfrm>
           <a:prstGeom prst="rect">
             <a:avLst/>
@@ -5118,41 +5079,59 @@
             </a:r>
           </a:p>
           <a:p>
+            <a:endParaRPr lang="en-US" sz="1400" dirty="0" smtClean="0">
+              <a:latin typeface="Rockwell" pitchFamily="18" charset="0"/>
+            </a:endParaRPr>
+          </a:p>
+          <a:p>
+            <a:r>
+              <a:rPr lang="en-US" sz="3200" dirty="0" smtClean="0">
+                <a:latin typeface="Rockwell" pitchFamily="18" charset="0"/>
+              </a:rPr>
+              <a:t>The plot on the right displays </a:t>
+            </a:r>
+            <a:r>
+              <a:rPr lang="en-US" sz="3200" dirty="0" smtClean="0">
+                <a:latin typeface="Rockwell" pitchFamily="18" charset="0"/>
+              </a:rPr>
+              <a:t>polling </a:t>
+            </a:r>
+            <a:r>
+              <a:rPr lang="en-US" sz="3200" dirty="0">
+                <a:latin typeface="Rockwell" pitchFamily="18" charset="0"/>
+              </a:rPr>
+              <a:t>averages for </a:t>
+            </a:r>
+            <a:r>
+              <a:rPr lang="en-US" sz="3200" dirty="0" smtClean="0">
+                <a:latin typeface="Rockwell" pitchFamily="18" charset="0"/>
+              </a:rPr>
+              <a:t>Mr</a:t>
+            </a:r>
+            <a:r>
+              <a:rPr lang="en-US" sz="3200" dirty="0">
+                <a:latin typeface="Rockwell" pitchFamily="18" charset="0"/>
+              </a:rPr>
+              <a:t>. Obama and Mr. Romney by swing state. Important events are </a:t>
+            </a:r>
+            <a:r>
+              <a:rPr lang="en-US" sz="3200" dirty="0" smtClean="0">
+                <a:latin typeface="Rockwell" pitchFamily="18" charset="0"/>
+              </a:rPr>
+              <a:t>indicated on the plot </a:t>
+            </a:r>
+            <a:r>
+              <a:rPr lang="en-US" sz="3200" dirty="0">
+                <a:latin typeface="Rockwell" pitchFamily="18" charset="0"/>
+              </a:rPr>
+              <a:t>as follows: </a:t>
+            </a:r>
             <a:endParaRPr lang="en-US" sz="3200" dirty="0" smtClean="0">
               <a:latin typeface="Rockwell" pitchFamily="18" charset="0"/>
             </a:endParaRPr>
           </a:p>
           <a:p>
-            <a:r>
-              <a:rPr lang="en-US" sz="3200" dirty="0" smtClean="0">
-                <a:latin typeface="Rockwell" pitchFamily="18" charset="0"/>
-              </a:rPr>
-              <a:t>The plot on the right displays Polling </a:t>
-            </a:r>
-            <a:r>
-              <a:rPr lang="en-US" sz="3200" dirty="0">
-                <a:latin typeface="Rockwell" pitchFamily="18" charset="0"/>
-              </a:rPr>
-              <a:t>averages for Mr. Obama and Mr. Romney by swing state. Important events are </a:t>
-            </a:r>
-            <a:r>
-              <a:rPr lang="en-US" sz="3200" dirty="0" smtClean="0">
-                <a:latin typeface="Rockwell" pitchFamily="18" charset="0"/>
-              </a:rPr>
-              <a:t>indicated on the plot </a:t>
-            </a:r>
-            <a:r>
-              <a:rPr lang="en-US" sz="3200" dirty="0">
-                <a:latin typeface="Rockwell" pitchFamily="18" charset="0"/>
-              </a:rPr>
-              <a:t>as follows: </a:t>
-            </a:r>
-            <a:endParaRPr lang="en-US" sz="3200" dirty="0" smtClean="0">
-              <a:latin typeface="Rockwell" pitchFamily="18" charset="0"/>
-            </a:endParaRPr>
-          </a:p>
-          <a:p>
-            <a:endParaRPr lang="en-US" sz="3200" dirty="0" smtClean="0">
+            <a:endParaRPr lang="en-US" sz="1400" dirty="0" smtClean="0">
               <a:latin typeface="Rockwell" pitchFamily="18" charset="0"/>
             </a:endParaRPr>
           </a:p>
@@ -5303,8 +5282,8 @@
         </p:nvSpPr>
         <p:spPr>
           <a:xfrm>
-            <a:off x="15736466" y="18049434"/>
-            <a:ext cx="11988561" cy="6740307"/>
+            <a:off x="14068926" y="19398020"/>
+            <a:ext cx="13162548" cy="4985980"/>
           </a:xfrm>
           <a:prstGeom prst="rect">
             <a:avLst/>
@@ -5328,217 +5307,138 @@
             </a:r>
           </a:p>
           <a:p>
+            <a:endParaRPr lang="en-US" sz="1400" dirty="0">
+              <a:latin typeface="Rockwell" pitchFamily="18" charset="0"/>
+            </a:endParaRPr>
+          </a:p>
+          <a:p>
+            <a:r>
+              <a:rPr lang="en-US" sz="3200" dirty="0" smtClean="0">
+                <a:latin typeface="Rockwell" pitchFamily="18" charset="0"/>
+              </a:rPr>
+              <a:t>This plot displays the total </a:t>
+            </a:r>
+            <a:r>
+              <a:rPr lang="en-US" sz="3200" dirty="0">
+                <a:latin typeface="Rockwell" pitchFamily="18" charset="0"/>
+              </a:rPr>
+              <a:t>weekly spending by Super PACs in support or opposition of </a:t>
+            </a:r>
+            <a:r>
+              <a:rPr lang="en-US" sz="3200" dirty="0" smtClean="0">
+                <a:latin typeface="Rockwell" pitchFamily="18" charset="0"/>
+              </a:rPr>
+              <a:t>the two candidates. The six event markers are indicated as in the Polling by Swing State plot above.</a:t>
+            </a:r>
+          </a:p>
+          <a:p>
+            <a:endParaRPr lang="en-US" sz="3200" dirty="0" smtClean="0">
+              <a:latin typeface="Rockwell" pitchFamily="18" charset="0"/>
+            </a:endParaRPr>
+          </a:p>
+          <a:p>
+            <a:r>
+              <a:rPr lang="en-US" sz="3200" dirty="0" smtClean="0">
+                <a:latin typeface="Rockwell" pitchFamily="18" charset="0"/>
+              </a:rPr>
+              <a:t>It can be observed that the Romney-benefitting Super PACs maintained a consistently higher level of opposition advertisement spending, while the Obama-benefitting Super PACs tended to spend more on overhead and swag</a:t>
+            </a:r>
+            <a:r>
+              <a:rPr lang="en-US" sz="3200" dirty="0" smtClean="0">
+                <a:latin typeface="Rockwell" pitchFamily="18" charset="0"/>
+              </a:rPr>
+              <a:t>.</a:t>
+            </a:r>
             <a:endParaRPr lang="en-US" sz="3200" dirty="0">
               <a:latin typeface="Rockwell" pitchFamily="18" charset="0"/>
             </a:endParaRPr>
           </a:p>
-          <a:p>
-            <a:r>
-              <a:rPr lang="en-US" sz="3200" dirty="0" smtClean="0">
-                <a:latin typeface="Rockwell" pitchFamily="18" charset="0"/>
-              </a:rPr>
-              <a:t>This plot displays the total </a:t>
-            </a:r>
-            <a:r>
-              <a:rPr lang="en-US" sz="3200" dirty="0">
-                <a:latin typeface="Rockwell" pitchFamily="18" charset="0"/>
-              </a:rPr>
-              <a:t>weekly spending by Super PACs in support or opposition of </a:t>
-            </a:r>
-            <a:r>
-              <a:rPr lang="en-US" sz="3200" dirty="0" smtClean="0">
-                <a:latin typeface="Rockwell" pitchFamily="18" charset="0"/>
-              </a:rPr>
-              <a:t>the two candidates. The six event markers are indicated as in the Polling by Swing State plot above.</a:t>
-            </a:r>
-          </a:p>
-          <a:p>
-            <a:endParaRPr lang="en-US" sz="3200" dirty="0" smtClean="0">
-              <a:latin typeface="Rockwell" pitchFamily="18" charset="0"/>
-            </a:endParaRPr>
-          </a:p>
-          <a:p>
-            <a:r>
-              <a:rPr lang="en-US" sz="3200" dirty="0" smtClean="0">
-                <a:latin typeface="Rockwell" pitchFamily="18" charset="0"/>
-              </a:rPr>
-              <a:t>It can be observed that the Romney-benefitting Super PACs maintained a consistently higher level of opposition advertisement spending, while the Obama-benefitting Super PACs tended to spend more on overhead and swag.</a:t>
-            </a:r>
-          </a:p>
-          <a:p>
-            <a:endParaRPr lang="en-US" sz="3200" dirty="0">
-              <a:latin typeface="Rockwell" pitchFamily="18" charset="0"/>
-            </a:endParaRPr>
-          </a:p>
-          <a:p>
-            <a:endParaRPr lang="en-US" sz="3200" dirty="0">
-              <a:latin typeface="Rockwell" pitchFamily="18" charset="0"/>
-            </a:endParaRPr>
-          </a:p>
-        </p:txBody>
-      </p:sp>
-      <p:grpSp>
-        <p:nvGrpSpPr>
-          <p:cNvPr id="7" name="Group 6"/>
-          <p:cNvGrpSpPr/>
+        </p:txBody>
+      </p:sp>
+      <p:sp>
+        <p:nvSpPr>
+          <p:cNvPr id="30" name="Rectangle 29"/>
+          <p:cNvSpPr/>
           <p:nvPr/>
-        </p:nvGrpSpPr>
-        <p:grpSpPr>
+        </p:nvSpPr>
+        <p:spPr>
           <a:xfrm>
-            <a:off x="15526916" y="11449050"/>
-            <a:ext cx="20842761" cy="6095999"/>
-            <a:chOff x="15584066" y="11334750"/>
-            <a:chExt cx="20842761" cy="6095999"/>
+            <a:off x="13801481" y="11468844"/>
+            <a:ext cx="23716993" cy="7360949"/>
           </a:xfrm>
-        </p:grpSpPr>
-        <p:sp>
-          <p:nvSpPr>
-            <p:cNvPr id="30" name="Rectangle 29"/>
-            <p:cNvSpPr/>
-            <p:nvPr/>
-          </p:nvSpPr>
-          <p:spPr>
-            <a:xfrm>
-              <a:off x="15584066" y="11334750"/>
-              <a:ext cx="20842761" cy="6095999"/>
-            </a:xfrm>
-            <a:prstGeom prst="rect">
-              <a:avLst/>
-            </a:prstGeom>
-            <a:noFill/>
-            <a:ln>
-              <a:solidFill>
-                <a:schemeClr val="accent4"/>
-              </a:solidFill>
-            </a:ln>
-          </p:spPr>
-          <p:style>
-            <a:lnRef idx="3">
-              <a:schemeClr val="lt1"/>
-            </a:lnRef>
-            <a:fillRef idx="1">
+          <a:prstGeom prst="rect">
+            <a:avLst/>
+          </a:prstGeom>
+          <a:noFill/>
+          <a:ln>
+            <a:solidFill>
               <a:schemeClr val="accent4"/>
-            </a:fillRef>
-            <a:effectRef idx="1">
-              <a:schemeClr val="accent4"/>
-            </a:effectRef>
-            <a:fontRef idx="minor">
-              <a:schemeClr val="lt1"/>
-            </a:fontRef>
-          </p:style>
-          <p:txBody>
-            <a:bodyPr rtlCol="0" anchor="ctr"/>
-            <a:lstStyle/>
-            <a:p>
-              <a:pPr algn="ctr"/>
-              <a:endParaRPr lang="en-US" dirty="0"/>
-            </a:p>
-          </p:txBody>
-        </p:sp>
-        <p:pic>
-          <p:nvPicPr>
-            <p:cNvPr id="27" name="Picture 26"/>
-            <p:cNvPicPr>
-              <a:picLocks noChangeAspect="1"/>
-            </p:cNvPicPr>
-            <p:nvPr/>
-          </p:nvPicPr>
-          <p:blipFill>
-            <a:blip r:embed="rId12" cstate="print">
-              <a:extLst>
-                <a:ext uri="{28A0092B-C50C-407E-A947-70E740481C1C}">
-                  <a14:useLocalDpi xmlns:a14="http://schemas.microsoft.com/office/drawing/2010/main" val="0"/>
-                </a:ext>
-              </a:extLst>
-            </a:blip>
-            <a:stretch>
-              <a:fillRect/>
-            </a:stretch>
-          </p:blipFill>
-          <p:spPr>
-            <a:xfrm>
-              <a:off x="15982985" y="11617711"/>
-              <a:ext cx="8352264" cy="5568176"/>
-            </a:xfrm>
-            <a:prstGeom prst="rect">
-              <a:avLst/>
-            </a:prstGeom>
-          </p:spPr>
-        </p:pic>
-        <p:sp>
-          <p:nvSpPr>
-            <p:cNvPr id="42" name="TextBox 41"/>
-            <p:cNvSpPr txBox="1"/>
-            <p:nvPr/>
-          </p:nvSpPr>
-          <p:spPr>
-            <a:xfrm>
-              <a:off x="24229803" y="11451455"/>
-              <a:ext cx="11988561" cy="5262979"/>
-            </a:xfrm>
-            <a:prstGeom prst="rect">
-              <a:avLst/>
-            </a:prstGeom>
-            <a:noFill/>
-          </p:spPr>
-          <p:txBody>
-            <a:bodyPr wrap="square" rtlCol="0">
-              <a:spAutoFit/>
-            </a:bodyPr>
-            <a:lstStyle/>
-            <a:p>
-              <a:r>
-                <a:rPr lang="en-US" sz="4800" dirty="0" smtClean="0">
-                  <a:solidFill>
-                    <a:srgbClr val="5D2884"/>
-                  </a:solidFill>
-                  <a:latin typeface="Rockwell" pitchFamily="18" charset="0"/>
-                </a:rPr>
-                <a:t>Spending by Candidate</a:t>
-              </a:r>
-            </a:p>
-            <a:p>
-              <a:endParaRPr lang="en-US" sz="3200" dirty="0">
-                <a:latin typeface="Rockwell" pitchFamily="18" charset="0"/>
-              </a:endParaRPr>
-            </a:p>
-            <a:p>
-              <a:r>
-                <a:rPr lang="en-US" sz="3200" dirty="0" smtClean="0">
-                  <a:latin typeface="Rockwell" pitchFamily="18" charset="0"/>
-                </a:rPr>
-                <a:t>This plot displays total weekly spending by Super PACs, on a log scale, benefitting each candidate.  The shaded region (1) indicates a period of lower spending by the Romney-benefitting Super PACs.</a:t>
-              </a:r>
-            </a:p>
-            <a:p>
-              <a:endParaRPr lang="en-US" sz="3200" dirty="0">
-                <a:latin typeface="Rockwell" pitchFamily="18" charset="0"/>
-              </a:endParaRPr>
-            </a:p>
-            <a:p>
-              <a:r>
-                <a:rPr lang="en-US" sz="3200" dirty="0" smtClean="0">
-                  <a:latin typeface="Rockwell" pitchFamily="18" charset="0"/>
-                </a:rPr>
-                <a:t>Note the Obama-benefitting Super PACs’ relatively steady spending throughout both the early shaded and later non-shaded region.  </a:t>
-              </a:r>
-              <a:endParaRPr lang="en-US" sz="3200" dirty="0">
-                <a:latin typeface="Rockwell" pitchFamily="18" charset="0"/>
-              </a:endParaRPr>
-            </a:p>
-          </p:txBody>
-        </p:sp>
-      </p:grpSp>
-      <p:sp>
-        <p:nvSpPr>
-          <p:cNvPr id="48" name="TextBox 47"/>
+            </a:solidFill>
+          </a:ln>
+        </p:spPr>
+        <p:style>
+          <a:lnRef idx="3">
+            <a:schemeClr val="lt1"/>
+          </a:lnRef>
+          <a:fillRef idx="1">
+            <a:schemeClr val="accent4"/>
+          </a:fillRef>
+          <a:effectRef idx="1">
+            <a:schemeClr val="accent4"/>
+          </a:effectRef>
+          <a:fontRef idx="minor">
+            <a:schemeClr val="lt1"/>
+          </a:fontRef>
+        </p:style>
+        <p:txBody>
+          <a:bodyPr rtlCol="0" anchor="ctr"/>
+          <a:lstStyle/>
+          <a:p>
+            <a:pPr algn="ctr"/>
+            <a:endParaRPr lang="en-US" dirty="0"/>
+          </a:p>
+        </p:txBody>
+      </p:sp>
+      <p:pic>
+        <p:nvPicPr>
+          <p:cNvPr id="27" name="Picture 26"/>
+          <p:cNvPicPr>
+            <a:picLocks noChangeAspect="1"/>
+          </p:cNvPicPr>
+          <p:nvPr/>
+        </p:nvPicPr>
+        <p:blipFill>
+          <a:blip r:embed="rId12" cstate="print">
+            <a:extLst>
+              <a:ext uri="{28A0092B-C50C-407E-A947-70E740481C1C}">
+                <a14:useLocalDpi xmlns:a14="http://schemas.microsoft.com/office/drawing/2010/main" val="0"/>
+              </a:ext>
+            </a:extLst>
+          </a:blip>
+          <a:stretch>
+            <a:fillRect/>
+          </a:stretch>
+        </p:blipFill>
+        <p:spPr>
+          <a:xfrm>
+            <a:off x="14068926" y="12365230"/>
+            <a:ext cx="8352264" cy="5568176"/>
+          </a:xfrm>
+          <a:prstGeom prst="rect">
+            <a:avLst/>
+          </a:prstGeom>
+        </p:spPr>
+      </p:pic>
+      <p:sp>
+        <p:nvSpPr>
+          <p:cNvPr id="42" name="TextBox 41"/>
           <p:cNvSpPr txBox="1"/>
           <p:nvPr/>
         </p:nvSpPr>
         <p:spPr>
           <a:xfrm>
-            <a:off x="37805562" y="11447353"/>
-            <a:ext cx="11988561" cy="6247864"/>
+            <a:off x="22507074" y="11658600"/>
+            <a:ext cx="8458200" cy="7171194"/>
           </a:xfrm>
           <a:prstGeom prst="rect">
             <a:avLst/>
@@ -5558,14 +5458,140 @@
                 </a:solidFill>
                 <a:latin typeface="Rockwell" pitchFamily="18" charset="0"/>
               </a:rPr>
-              <a:t>Effect of Spending on Polling</a:t>
-            </a:r>
-          </a:p>
-          <a:p>
+              <a:t>Spending by Candidate</a:t>
+            </a:r>
+          </a:p>
+          <a:p>
+            <a:endParaRPr lang="en-US" sz="1400" dirty="0">
+              <a:latin typeface="Rockwell" pitchFamily="18" charset="0"/>
+            </a:endParaRPr>
+          </a:p>
+          <a:p>
+            <a:r>
+              <a:rPr lang="en-US" sz="3200" dirty="0" smtClean="0">
+                <a:latin typeface="Rockwell" pitchFamily="18" charset="0"/>
+              </a:rPr>
+              <a:t>The left plot displays </a:t>
+            </a:r>
+            <a:r>
+              <a:rPr lang="en-US" sz="3200" dirty="0" smtClean="0">
+                <a:latin typeface="Rockwell" pitchFamily="18" charset="0"/>
+              </a:rPr>
+              <a:t>total weekly spending by Super PACs, on a log scale, benefitting each candidate.  The shaded region (1) indicates a period of lower spending by the Romney-benefitting Super </a:t>
+            </a:r>
+            <a:r>
+              <a:rPr lang="en-US" sz="3200" dirty="0" smtClean="0">
+                <a:latin typeface="Rockwell" pitchFamily="18" charset="0"/>
+              </a:rPr>
+              <a:t>PACs. Note </a:t>
+            </a:r>
+            <a:r>
+              <a:rPr lang="en-US" sz="3200" dirty="0" smtClean="0">
+                <a:latin typeface="Rockwell" pitchFamily="18" charset="0"/>
+              </a:rPr>
+              <a:t>the Obama-benefitting Super PACs’ relatively steady spending throughout both the early shaded and later non-shaded region.  </a:t>
+            </a:r>
+            <a:endParaRPr lang="en-US" sz="3200" dirty="0" smtClean="0">
+              <a:latin typeface="Rockwell" pitchFamily="18" charset="0"/>
+            </a:endParaRPr>
+          </a:p>
+          <a:p>
+            <a:endParaRPr lang="en-US" sz="1400" dirty="0">
+              <a:latin typeface="Rockwell" pitchFamily="18" charset="0"/>
+            </a:endParaRPr>
+          </a:p>
+          <a:p>
+            <a:r>
+              <a:rPr lang="en-US" sz="3200" dirty="0" smtClean="0">
+                <a:latin typeface="Rockwell" pitchFamily="18" charset="0"/>
+              </a:rPr>
+              <a:t>The right </a:t>
+            </a:r>
+            <a:r>
+              <a:rPr lang="en-US" sz="3200" dirty="0">
+                <a:latin typeface="Rockwell" pitchFamily="18" charset="0"/>
+              </a:rPr>
+              <a:t>plot </a:t>
+            </a:r>
+            <a:r>
+              <a:rPr lang="en-US" sz="3200" dirty="0" smtClean="0">
+                <a:latin typeface="Rockwell" pitchFamily="18" charset="0"/>
+              </a:rPr>
+              <a:t>shows the </a:t>
+            </a:r>
+            <a:r>
+              <a:rPr lang="en-US" sz="3200" dirty="0">
+                <a:latin typeface="Rockwell" pitchFamily="18" charset="0"/>
+              </a:rPr>
+              <a:t>total spending by the top Super PACs split by candidate. The </a:t>
+            </a:r>
+            <a:r>
+              <a:rPr lang="en-US" sz="3200" dirty="0" smtClean="0">
+                <a:latin typeface="Rockwell" pitchFamily="18" charset="0"/>
+              </a:rPr>
+              <a:t>cumulative amounts </a:t>
+            </a:r>
+            <a:r>
+              <a:rPr lang="en-US" sz="3200" dirty="0">
+                <a:latin typeface="Rockwell" pitchFamily="18" charset="0"/>
+              </a:rPr>
+              <a:t>spent are displayed vertically, by the </a:t>
+            </a:r>
+            <a:r>
+              <a:rPr lang="en-US" sz="3200" dirty="0" smtClean="0">
+                <a:latin typeface="Rockwell" pitchFamily="18" charset="0"/>
+              </a:rPr>
+              <a:t>benefiting </a:t>
+            </a:r>
+            <a:r>
+              <a:rPr lang="en-US" sz="3200" dirty="0">
+                <a:latin typeface="Rockwell" pitchFamily="18" charset="0"/>
+              </a:rPr>
+              <a:t>candidate.</a:t>
+            </a:r>
             <a:endParaRPr lang="en-US" sz="3200" dirty="0">
               <a:latin typeface="Rockwell" pitchFamily="18" charset="0"/>
             </a:endParaRPr>
           </a:p>
+        </p:txBody>
+      </p:sp>
+      <p:sp>
+        <p:nvSpPr>
+          <p:cNvPr id="48" name="TextBox 47"/>
+          <p:cNvSpPr txBox="1"/>
+          <p:nvPr/>
+        </p:nvSpPr>
+        <p:spPr>
+          <a:xfrm>
+            <a:off x="38782752" y="11926590"/>
+            <a:ext cx="11521440" cy="5693866"/>
+          </a:xfrm>
+          <a:prstGeom prst="rect">
+            <a:avLst/>
+          </a:prstGeom>
+          <a:noFill/>
+        </p:spPr>
+        <p:txBody>
+          <a:bodyPr wrap="square" rtlCol="0">
+            <a:spAutoFit/>
+          </a:bodyPr>
+          <a:lstStyle/>
+          <a:p>
+            <a:r>
+              <a:rPr lang="en-US" sz="4800" dirty="0" smtClean="0">
+                <a:solidFill>
+                  <a:srgbClr val="5D2884"/>
+                </a:solidFill>
+                <a:latin typeface="Rockwell" pitchFamily="18" charset="0"/>
+              </a:rPr>
+              <a:t>Effect of Spending on Polling</a:t>
+            </a:r>
+          </a:p>
+          <a:p>
+            <a:endParaRPr lang="en-US" sz="1400" dirty="0">
+              <a:latin typeface="Rockwell" pitchFamily="18" charset="0"/>
+            </a:endParaRPr>
+          </a:p>
           <a:p>
             <a:r>
               <a:rPr lang="en-US" sz="3200" dirty="0" smtClean="0">
@@ -5587,23 +5613,624 @@
             </a:r>
           </a:p>
           <a:p>
+            <a:endParaRPr lang="en-US" sz="1400" dirty="0">
+              <a:latin typeface="Rockwell" pitchFamily="18" charset="0"/>
+            </a:endParaRPr>
+          </a:p>
+          <a:p>
+            <a:r>
+              <a:rPr lang="en-US" sz="3200" dirty="0" smtClean="0">
+                <a:latin typeface="Rockwell" pitchFamily="18" charset="0"/>
+              </a:rPr>
+              <a:t>The shaded region from the Spending by Candidate plot is displayed once again. It </a:t>
+            </a:r>
+            <a:r>
+              <a:rPr lang="en-US" sz="3200" dirty="0">
+                <a:latin typeface="Rockwell" pitchFamily="18" charset="0"/>
+              </a:rPr>
+              <a:t>does not seem that this spending increase had a measurable eﬀect on the overall trend in the polls at this time.</a:t>
+            </a:r>
+          </a:p>
+        </p:txBody>
+      </p:sp>
+      <p:graphicFrame>
+        <p:nvGraphicFramePr>
+          <p:cNvPr id="12" name="Table 11"/>
+          <p:cNvGraphicFramePr>
+            <a:graphicFrameLocks noGrp="1"/>
+          </p:cNvGraphicFramePr>
+          <p:nvPr>
+            <p:extLst>
+              <p:ext uri="{D42A27DB-BD31-4B8C-83A1-F6EECF244321}">
+                <p14:modId xmlns:p14="http://schemas.microsoft.com/office/powerpoint/2010/main" val="1855251361"/>
+              </p:ext>
+            </p:extLst>
+          </p:nvPr>
+        </p:nvGraphicFramePr>
+        <p:xfrm>
+          <a:off x="1105184" y="16151289"/>
+          <a:ext cx="7614214" cy="5577840"/>
+        </p:xfrm>
+        <a:graphic>
+          <a:graphicData uri="http://schemas.openxmlformats.org/drawingml/2006/table">
+            <a:tbl>
+              <a:tblPr firstRow="1" bandRow="1">
+                <a:tableStyleId>{2D5ABB26-0587-4C30-8999-92F81FD0307C}</a:tableStyleId>
+              </a:tblPr>
+              <a:tblGrid>
+                <a:gridCol w="3194614"/>
+                <a:gridCol w="4419600"/>
+              </a:tblGrid>
+              <a:tr h="370840">
+                <a:tc>
+                  <a:txBody>
+                    <a:bodyPr/>
+                    <a:lstStyle/>
+                    <a:p>
+                      <a:pPr marL="0" marR="0" lvl="0" indent="0" algn="l" defTabSz="4389120" rtl="0" eaLnBrk="1" fontAlgn="auto" latinLnBrk="0" hangingPunct="1">
+                        <a:lnSpc>
+                          <a:spcPct val="100000"/>
+                        </a:lnSpc>
+                        <a:spcBef>
+                          <a:spcPts val="0"/>
+                        </a:spcBef>
+                        <a:spcAft>
+                          <a:spcPts val="0"/>
+                        </a:spcAft>
+                        <a:buClrTx/>
+                        <a:buSzTx/>
+                        <a:buFontTx/>
+                        <a:buNone/>
+                        <a:tabLst/>
+                        <a:defRPr/>
+                      </a:pPr>
+                      <a:r>
+                        <a:rPr kumimoji="0" lang="en-US" sz="3200" b="1" i="0" u="none" strike="noStrike" kern="1200" cap="none" spc="0" normalizeH="0" baseline="0" noProof="0" dirty="0" smtClean="0">
+                          <a:ln>
+                            <a:noFill/>
+                          </a:ln>
+                          <a:solidFill>
+                            <a:srgbClr val="FF0000"/>
+                          </a:solidFill>
+                          <a:effectLst/>
+                          <a:uLnTx/>
+                          <a:uFillTx/>
+                          <a:latin typeface="Rockwell" pitchFamily="18" charset="0"/>
+                          <a:ea typeface="+mn-ea"/>
+                          <a:cs typeface="+mn-cs"/>
+                        </a:rPr>
+                        <a:t>Ad</a:t>
+                      </a:r>
+                      <a:endParaRPr lang="en-US" sz="3200" dirty="0"/>
+                    </a:p>
+                  </a:txBody>
+                  <a:tcPr/>
+                </a:tc>
+                <a:tc>
+                  <a:txBody>
+                    <a:bodyPr/>
+                    <a:lstStyle/>
+                    <a:p>
+                      <a:pPr marL="0" marR="0" lvl="0" indent="0" algn="l" defTabSz="4389120" rtl="0" eaLnBrk="1" fontAlgn="auto" latinLnBrk="0" hangingPunct="1">
+                        <a:lnSpc>
+                          <a:spcPct val="100000"/>
+                        </a:lnSpc>
+                        <a:spcBef>
+                          <a:spcPts val="0"/>
+                        </a:spcBef>
+                        <a:spcAft>
+                          <a:spcPts val="0"/>
+                        </a:spcAft>
+                        <a:buClrTx/>
+                        <a:buSzTx/>
+                        <a:buFontTx/>
+                        <a:buNone/>
+                        <a:tabLst/>
+                        <a:defRPr/>
+                      </a:pPr>
+                      <a:r>
+                        <a:rPr kumimoji="0" lang="en-US" sz="2400" b="0" i="0" u="none" strike="noStrike" kern="1200" cap="none" spc="0" normalizeH="0" baseline="0" noProof="0" dirty="0" smtClean="0">
+                          <a:ln>
+                            <a:noFill/>
+                          </a:ln>
+                          <a:solidFill>
+                            <a:srgbClr val="000000"/>
+                          </a:solidFill>
+                          <a:effectLst/>
+                          <a:uLnTx/>
+                          <a:uFillTx/>
+                          <a:latin typeface="Rockwell" pitchFamily="18" charset="0"/>
+                          <a:ea typeface="+mn-ea"/>
+                          <a:cs typeface="+mn-cs"/>
+                        </a:rPr>
+                        <a:t>Advertisement spending, including television, radio, and online</a:t>
+                      </a:r>
+                      <a:endParaRPr lang="en-US" sz="2400" dirty="0"/>
+                    </a:p>
+                  </a:txBody>
+                  <a:tcPr/>
+                </a:tc>
+              </a:tr>
+              <a:tr h="370840">
+                <a:tc>
+                  <a:txBody>
+                    <a:bodyPr/>
+                    <a:lstStyle/>
+                    <a:p>
+                      <a:r>
+                        <a:rPr kumimoji="0" lang="en-US" sz="3200" b="1" i="0" u="none" strike="noStrike" kern="1200" cap="none" spc="0" normalizeH="0" baseline="0" noProof="0" dirty="0" smtClean="0">
+                          <a:ln>
+                            <a:noFill/>
+                          </a:ln>
+                          <a:solidFill>
+                            <a:srgbClr val="0070C0"/>
+                          </a:solidFill>
+                          <a:effectLst/>
+                          <a:uLnTx/>
+                          <a:uFillTx/>
+                          <a:latin typeface="Rockwell" pitchFamily="18" charset="0"/>
+                          <a:ea typeface="+mn-ea"/>
+                          <a:cs typeface="+mn-cs"/>
+                        </a:rPr>
+                        <a:t>Direct Contact</a:t>
+                      </a:r>
+                      <a:r>
+                        <a:rPr kumimoji="0" lang="en-US" sz="2400" b="1" i="0" u="none" strike="noStrike" kern="1200" cap="none" spc="0" normalizeH="0" baseline="0" noProof="0" dirty="0" smtClean="0">
+                          <a:ln>
+                            <a:noFill/>
+                          </a:ln>
+                          <a:solidFill>
+                            <a:srgbClr val="0070C0"/>
+                          </a:solidFill>
+                          <a:effectLst/>
+                          <a:uLnTx/>
+                          <a:uFillTx/>
+                          <a:latin typeface="Rockwell" pitchFamily="18" charset="0"/>
+                          <a:ea typeface="+mn-ea"/>
+                          <a:cs typeface="+mn-cs"/>
+                        </a:rPr>
+                        <a:t> </a:t>
+                      </a:r>
+                      <a:endParaRPr lang="en-US" sz="2400" dirty="0"/>
+                    </a:p>
+                  </a:txBody>
+                  <a:tcPr/>
+                </a:tc>
+                <a:tc>
+                  <a:txBody>
+                    <a:bodyPr/>
+                    <a:lstStyle/>
+                    <a:p>
+                      <a:pPr marL="0" marR="0" lvl="0" indent="0" algn="l" defTabSz="4389120" rtl="0" eaLnBrk="1" fontAlgn="auto" latinLnBrk="0" hangingPunct="1">
+                        <a:lnSpc>
+                          <a:spcPct val="100000"/>
+                        </a:lnSpc>
+                        <a:spcBef>
+                          <a:spcPts val="0"/>
+                        </a:spcBef>
+                        <a:spcAft>
+                          <a:spcPts val="0"/>
+                        </a:spcAft>
+                        <a:buClrTx/>
+                        <a:buSzTx/>
+                        <a:buFontTx/>
+                        <a:buNone/>
+                        <a:tabLst/>
+                        <a:defRPr/>
+                      </a:pPr>
+                      <a:r>
+                        <a:rPr kumimoji="0" lang="en-US" sz="2400" b="0" i="0" u="none" strike="noStrike" kern="1200" cap="none" spc="0" normalizeH="0" baseline="0" noProof="0" dirty="0" smtClean="0">
+                          <a:ln>
+                            <a:noFill/>
+                          </a:ln>
+                          <a:solidFill>
+                            <a:srgbClr val="000000"/>
+                          </a:solidFill>
+                          <a:effectLst/>
+                          <a:uLnTx/>
+                          <a:uFillTx/>
+                          <a:latin typeface="Rockwell" pitchFamily="18" charset="0"/>
+                          <a:ea typeface="+mn-ea"/>
+                          <a:cs typeface="+mn-cs"/>
+                        </a:rPr>
+                        <a:t>Direct voter contact, such as canvassing</a:t>
+                      </a:r>
+                      <a:endParaRPr lang="en-US" sz="2400" dirty="0"/>
+                    </a:p>
+                  </a:txBody>
+                  <a:tcPr/>
+                </a:tc>
+              </a:tr>
+              <a:tr h="370840">
+                <a:tc>
+                  <a:txBody>
+                    <a:bodyPr/>
+                    <a:lstStyle/>
+                    <a:p>
+                      <a:r>
+                        <a:rPr kumimoji="0" lang="en-US" sz="3200" b="1" i="0" u="none" strike="noStrike" kern="1200" cap="none" spc="0" normalizeH="0" baseline="0" noProof="0" dirty="0" smtClean="0">
+                          <a:ln>
+                            <a:noFill/>
+                          </a:ln>
+                          <a:solidFill>
+                            <a:srgbClr val="00B050"/>
+                          </a:solidFill>
+                          <a:effectLst/>
+                          <a:uLnTx/>
+                          <a:uFillTx/>
+                          <a:latin typeface="Rockwell" pitchFamily="18" charset="0"/>
+                          <a:ea typeface="+mn-ea"/>
+                          <a:cs typeface="+mn-cs"/>
+                        </a:rPr>
+                        <a:t>Overhead</a:t>
+                      </a:r>
+                      <a:endParaRPr lang="en-US" sz="2400" dirty="0"/>
+                    </a:p>
+                  </a:txBody>
+                  <a:tcPr/>
+                </a:tc>
+                <a:tc>
+                  <a:txBody>
+                    <a:bodyPr/>
+                    <a:lstStyle/>
+                    <a:p>
+                      <a:pPr marL="0" marR="0" lvl="0" indent="0" algn="l" defTabSz="4389120" rtl="0" eaLnBrk="1" fontAlgn="auto" latinLnBrk="0" hangingPunct="1">
+                        <a:lnSpc>
+                          <a:spcPct val="100000"/>
+                        </a:lnSpc>
+                        <a:spcBef>
+                          <a:spcPts val="0"/>
+                        </a:spcBef>
+                        <a:spcAft>
+                          <a:spcPts val="0"/>
+                        </a:spcAft>
+                        <a:buClrTx/>
+                        <a:buSzTx/>
+                        <a:buFontTx/>
+                        <a:buNone/>
+                        <a:tabLst/>
+                        <a:defRPr/>
+                      </a:pPr>
+                      <a:r>
+                        <a:rPr kumimoji="0" lang="en-US" sz="2400" b="0" i="0" u="none" strike="noStrike" kern="1200" cap="none" spc="0" normalizeH="0" baseline="0" noProof="0" dirty="0" smtClean="0">
+                          <a:ln>
+                            <a:noFill/>
+                          </a:ln>
+                          <a:solidFill>
+                            <a:srgbClr val="000000"/>
+                          </a:solidFill>
+                          <a:effectLst/>
+                          <a:uLnTx/>
+                          <a:uFillTx/>
+                          <a:latin typeface="Rockwell" pitchFamily="18" charset="0"/>
+                          <a:ea typeface="+mn-ea"/>
+                          <a:cs typeface="+mn-cs"/>
+                        </a:rPr>
+                        <a:t>Expenditures related to the ongoing cost of running an Super PAC, including salary, rent, consultants, fundraising, and travel</a:t>
+                      </a:r>
+                    </a:p>
+                  </a:txBody>
+                  <a:tcPr/>
+                </a:tc>
+              </a:tr>
+              <a:tr h="370840">
+                <a:tc>
+                  <a:txBody>
+                    <a:bodyPr/>
+                    <a:lstStyle/>
+                    <a:p>
+                      <a:r>
+                        <a:rPr kumimoji="0" lang="en-US" sz="3200" b="1" i="0" u="none" strike="noStrike" kern="1200" cap="none" spc="0" normalizeH="0" baseline="0" noProof="0" dirty="0" smtClean="0">
+                          <a:ln>
+                            <a:noFill/>
+                          </a:ln>
+                          <a:solidFill>
+                            <a:srgbClr val="7030A0"/>
+                          </a:solidFill>
+                          <a:effectLst/>
+                          <a:uLnTx/>
+                          <a:uFillTx/>
+                          <a:latin typeface="Rockwell" pitchFamily="18" charset="0"/>
+                          <a:ea typeface="+mn-ea"/>
+                          <a:cs typeface="+mn-cs"/>
+                        </a:rPr>
+                        <a:t>Swag</a:t>
+                      </a:r>
+                      <a:r>
+                        <a:rPr kumimoji="0" lang="en-US" sz="3200" b="0" i="0" u="none" strike="noStrike" kern="1200" cap="none" spc="0" normalizeH="0" baseline="0" noProof="0" dirty="0" smtClean="0">
+                          <a:ln>
+                            <a:noFill/>
+                          </a:ln>
+                          <a:solidFill>
+                            <a:srgbClr val="7030A0"/>
+                          </a:solidFill>
+                          <a:effectLst/>
+                          <a:uLnTx/>
+                          <a:uFillTx/>
+                          <a:latin typeface="Rockwell" pitchFamily="18" charset="0"/>
+                          <a:ea typeface="+mn-ea"/>
+                          <a:cs typeface="+mn-cs"/>
+                        </a:rPr>
+                        <a:t> </a:t>
+                      </a:r>
+                      <a:endParaRPr lang="en-US" sz="2400" dirty="0"/>
+                    </a:p>
+                  </a:txBody>
+                  <a:tcPr/>
+                </a:tc>
+                <a:tc>
+                  <a:txBody>
+                    <a:bodyPr/>
+                    <a:lstStyle/>
+                    <a:p>
+                      <a:pPr marL="0" marR="0" lvl="0" indent="0" algn="l" defTabSz="4389120" rtl="0" eaLnBrk="1" fontAlgn="auto" latinLnBrk="0" hangingPunct="1">
+                        <a:lnSpc>
+                          <a:spcPct val="100000"/>
+                        </a:lnSpc>
+                        <a:spcBef>
+                          <a:spcPts val="0"/>
+                        </a:spcBef>
+                        <a:spcAft>
+                          <a:spcPts val="0"/>
+                        </a:spcAft>
+                        <a:buClrTx/>
+                        <a:buSzTx/>
+                        <a:buFontTx/>
+                        <a:buNone/>
+                        <a:tabLst/>
+                        <a:defRPr/>
+                      </a:pPr>
+                      <a:r>
+                        <a:rPr kumimoji="0" lang="en-US" sz="2400" b="0" i="0" u="none" strike="noStrike" kern="1200" cap="none" spc="0" normalizeH="0" baseline="0" noProof="0" dirty="0" smtClean="0">
+                          <a:ln>
+                            <a:noFill/>
+                          </a:ln>
+                          <a:solidFill>
+                            <a:srgbClr val="000000"/>
+                          </a:solidFill>
+                          <a:effectLst/>
+                          <a:uLnTx/>
+                          <a:uFillTx/>
+                          <a:latin typeface="Rockwell" pitchFamily="18" charset="0"/>
+                          <a:ea typeface="+mn-ea"/>
+                          <a:cs typeface="+mn-cs"/>
+                        </a:rPr>
+                        <a:t>Clothing, signs, and other promotional material</a:t>
+                      </a:r>
+                      <a:endParaRPr kumimoji="0" lang="en-US" sz="3200" b="0" i="0" u="none" strike="noStrike" kern="1200" cap="none" spc="0" normalizeH="0" baseline="0" noProof="0" dirty="0" smtClean="0">
+                        <a:ln>
+                          <a:noFill/>
+                        </a:ln>
+                        <a:solidFill>
+                          <a:srgbClr val="000000"/>
+                        </a:solidFill>
+                        <a:effectLst/>
+                        <a:uLnTx/>
+                        <a:uFillTx/>
+                        <a:latin typeface="Rockwell" pitchFamily="18" charset="0"/>
+                        <a:ea typeface="+mn-ea"/>
+                        <a:cs typeface="+mn-cs"/>
+                      </a:endParaRPr>
+                    </a:p>
+                  </a:txBody>
+                  <a:tcPr/>
+                </a:tc>
+              </a:tr>
+              <a:tr h="370840">
+                <a:tc>
+                  <a:txBody>
+                    <a:bodyPr/>
+                    <a:lstStyle/>
+                    <a:p>
+                      <a:r>
+                        <a:rPr kumimoji="0" lang="en-US" sz="3200" b="1" i="0" u="none" strike="noStrike" kern="1200" cap="none" spc="0" normalizeH="0" baseline="0" noProof="0" dirty="0" smtClean="0">
+                          <a:ln>
+                            <a:noFill/>
+                          </a:ln>
+                          <a:solidFill>
+                            <a:srgbClr val="FF6600"/>
+                          </a:solidFill>
+                          <a:effectLst/>
+                          <a:uLnTx/>
+                          <a:uFillTx/>
+                          <a:latin typeface="Rockwell" pitchFamily="18" charset="0"/>
+                          <a:ea typeface="+mn-ea"/>
+                          <a:cs typeface="+mn-cs"/>
+                        </a:rPr>
+                        <a:t>Other</a:t>
+                      </a:r>
+                      <a:r>
+                        <a:rPr kumimoji="0" lang="en-US" sz="3200" b="0" i="0" u="none" strike="noStrike" kern="1200" cap="none" spc="0" normalizeH="0" baseline="0" noProof="0" dirty="0" smtClean="0">
+                          <a:ln>
+                            <a:noFill/>
+                          </a:ln>
+                          <a:solidFill>
+                            <a:srgbClr val="FF6600"/>
+                          </a:solidFill>
+                          <a:effectLst/>
+                          <a:uLnTx/>
+                          <a:uFillTx/>
+                          <a:latin typeface="Rockwell" pitchFamily="18" charset="0"/>
+                          <a:ea typeface="+mn-ea"/>
+                          <a:cs typeface="+mn-cs"/>
+                        </a:rPr>
+                        <a:t> </a:t>
+                      </a:r>
+                      <a:endParaRPr lang="en-US" sz="2400" dirty="0"/>
+                    </a:p>
+                  </a:txBody>
+                  <a:tcPr/>
+                </a:tc>
+                <a:tc>
+                  <a:txBody>
+                    <a:bodyPr/>
+                    <a:lstStyle/>
+                    <a:p>
+                      <a:pPr marL="0" marR="0" lvl="0" indent="0" algn="l" defTabSz="4389120" rtl="0" eaLnBrk="1" fontAlgn="auto" latinLnBrk="0" hangingPunct="1">
+                        <a:lnSpc>
+                          <a:spcPct val="100000"/>
+                        </a:lnSpc>
+                        <a:spcBef>
+                          <a:spcPts val="0"/>
+                        </a:spcBef>
+                        <a:spcAft>
+                          <a:spcPts val="0"/>
+                        </a:spcAft>
+                        <a:buClrTx/>
+                        <a:buSzTx/>
+                        <a:buFontTx/>
+                        <a:buNone/>
+                        <a:tabLst/>
+                        <a:defRPr/>
+                      </a:pPr>
+                      <a:r>
+                        <a:rPr kumimoji="0" lang="en-US" sz="2400" b="0" i="0" u="none" strike="noStrike" kern="1200" cap="none" spc="0" normalizeH="0" baseline="0" noProof="0" dirty="0" smtClean="0">
+                          <a:ln>
+                            <a:noFill/>
+                          </a:ln>
+                          <a:solidFill>
+                            <a:srgbClr val="000000"/>
+                          </a:solidFill>
+                          <a:effectLst/>
+                          <a:uLnTx/>
+                          <a:uFillTx/>
+                          <a:latin typeface="Rockwell" pitchFamily="18" charset="0"/>
+                          <a:ea typeface="+mn-ea"/>
+                          <a:cs typeface="+mn-cs"/>
+                        </a:rPr>
+                        <a:t>All expenses that do not ﬁt into the above buckets</a:t>
+                      </a:r>
+                    </a:p>
+                  </a:txBody>
+                  <a:tcPr/>
+                </a:tc>
+              </a:tr>
+            </a:tbl>
+          </a:graphicData>
+        </a:graphic>
+      </p:graphicFrame>
+      <p:sp>
+        <p:nvSpPr>
+          <p:cNvPr id="52" name="Rectangle 51"/>
+          <p:cNvSpPr/>
+          <p:nvPr/>
+        </p:nvSpPr>
+        <p:spPr>
+          <a:xfrm>
+            <a:off x="366226" y="22274463"/>
+            <a:ext cx="12508713" cy="1337343"/>
+          </a:xfrm>
+          <a:prstGeom prst="rect">
+            <a:avLst/>
+          </a:prstGeom>
+          <a:solidFill>
+            <a:srgbClr val="5D2884"/>
+          </a:solidFill>
+          <a:ln>
+            <a:noFill/>
+          </a:ln>
+        </p:spPr>
+        <p:style>
+          <a:lnRef idx="2">
+            <a:schemeClr val="accent1">
+              <a:shade val="50000"/>
+            </a:schemeClr>
+          </a:lnRef>
+          <a:fillRef idx="1">
+            <a:schemeClr val="accent1"/>
+          </a:fillRef>
+          <a:effectRef idx="0">
+            <a:schemeClr val="accent1"/>
+          </a:effectRef>
+          <a:fontRef idx="minor">
+            <a:schemeClr val="lt1"/>
+          </a:fontRef>
+        </p:style>
+        <p:txBody>
+          <a:bodyPr rtlCol="0" anchor="ctr"/>
+          <a:lstStyle/>
+          <a:p>
+            <a:pPr algn="ctr"/>
+            <a:r>
+              <a:rPr lang="en-US" sz="5400" b="1" dirty="0" smtClean="0">
+                <a:latin typeface="Rockwell" pitchFamily="18" charset="0"/>
+              </a:rPr>
+              <a:t>Tools</a:t>
+            </a:r>
+            <a:endParaRPr lang="en-US" sz="5400" b="1" dirty="0">
+              <a:latin typeface="Rockwell" pitchFamily="18" charset="0"/>
+            </a:endParaRPr>
+          </a:p>
+        </p:txBody>
+      </p:sp>
+      <p:sp>
+        <p:nvSpPr>
+          <p:cNvPr id="53" name="TextBox 52"/>
+          <p:cNvSpPr txBox="1"/>
+          <p:nvPr/>
+        </p:nvSpPr>
+        <p:spPr>
+          <a:xfrm flipH="1">
+            <a:off x="838200" y="23799225"/>
+            <a:ext cx="11521440" cy="1569660"/>
+          </a:xfrm>
+          <a:prstGeom prst="rect">
+            <a:avLst/>
+          </a:prstGeom>
+          <a:noFill/>
+          <a:ln w="38100">
+            <a:noFill/>
+          </a:ln>
+        </p:spPr>
+        <p:txBody>
+          <a:bodyPr wrap="square" rtlCol="0">
+            <a:spAutoFit/>
+          </a:bodyPr>
+          <a:lstStyle/>
+          <a:p>
+            <a:pPr algn="just"/>
+            <a:r>
+              <a:rPr lang="en-US" sz="3200" dirty="0" smtClean="0">
+                <a:latin typeface="Rockwell" pitchFamily="18" charset="0"/>
+              </a:rPr>
+              <a:t>R</a:t>
+            </a:r>
+          </a:p>
+          <a:p>
+            <a:pPr algn="just"/>
+            <a:r>
+              <a:rPr lang="en-US" sz="3200" dirty="0" smtClean="0">
+                <a:latin typeface="Rockwell" pitchFamily="18" charset="0"/>
+              </a:rPr>
+              <a:t>Packages:</a:t>
+            </a:r>
+            <a:r>
+              <a:rPr lang="en-US" sz="3200" dirty="0">
+                <a:latin typeface="Rockwell" pitchFamily="18" charset="0"/>
+              </a:rPr>
+              <a:t> </a:t>
+            </a:r>
+            <a:r>
+              <a:rPr lang="en-US" sz="3200" dirty="0" smtClean="0">
+                <a:latin typeface="Rockwell" pitchFamily="18" charset="0"/>
+              </a:rPr>
+              <a:t>XML, ggplot2, plyr, reshape2, lubridate, scales, RColorBrewer,  zoo</a:t>
+            </a:r>
+            <a:r>
+              <a:rPr lang="en-US" sz="3200" dirty="0">
+                <a:latin typeface="Rockwell" pitchFamily="18" charset="0"/>
+              </a:rPr>
+              <a:t>, </a:t>
+            </a:r>
+            <a:r>
+              <a:rPr lang="en-US" sz="3200" dirty="0" smtClean="0">
+                <a:latin typeface="Rockwell" pitchFamily="18" charset="0"/>
+              </a:rPr>
+              <a:t>forecast</a:t>
+            </a:r>
             <a:endParaRPr lang="en-US" sz="3200" dirty="0">
               <a:latin typeface="Rockwell" pitchFamily="18" charset="0"/>
             </a:endParaRPr>
-          </a:p>
-          <a:p>
-            <a:r>
-              <a:rPr lang="en-US" sz="3200" dirty="0" smtClean="0">
-                <a:latin typeface="Rockwell" pitchFamily="18" charset="0"/>
-              </a:rPr>
-              <a:t>The shaded region from the Spending by Candidate plot is displayed once again. It </a:t>
-            </a:r>
-            <a:r>
-              <a:rPr lang="en-US" sz="3200" dirty="0">
-                <a:latin typeface="Rockwell" pitchFamily="18" charset="0"/>
-              </a:rPr>
-              <a:t>does not seem that this spending increase had a measurable eﬀect on the overall trend in the polls at this time.</a:t>
-            </a:r>
           </a:p>
         </p:txBody>
       </p:sp>

</xml_diff>

<commit_message>
Small updates to the poster, saving from Mac
</commit_message>
<xml_diff>
--- a/Poster/Election2012Poster.pptx
+++ b/Poster/Election2012Poster.pptx
@@ -109,7 +109,7 @@
   </p:defaultTextStyle>
   <p:extLst>
     <p:ext uri="{EFAFB233-063F-42B5-8137-9DF3F51BA10A}">
-      <p15:sldGuideLst xmlns:p15="http://schemas.microsoft.com/office/powerpoint/2012/main" xmlns="">
+      <p15:sldGuideLst xmlns="" xmlns:p15="http://schemas.microsoft.com/office/powerpoint/2012/main">
         <p15:guide id="1" orient="horz" pos="8064">
           <p15:clr>
             <a:srgbClr val="A4A3A4"/>
@@ -208,7 +208,7 @@
           <a:p>
             <a:fld id="{E3864992-0E3E-4687-ABD4-3B2927D0EAC5}" type="datetimeFigureOut">
               <a:rPr lang="en-US" smtClean="0"/>
-              <a:t>7/30/2013</a:t>
+              <a:t>8/1/13</a:t>
             </a:fld>
             <a:endParaRPr lang="en-US"/>
           </a:p>
@@ -741,7 +741,7 @@
           <a:p>
             <a:fld id="{C6F99218-CF29-4270-A98A-29700F174958}" type="datetimeFigureOut">
               <a:rPr lang="en-US" smtClean="0"/>
-              <a:t>7/30/2013</a:t>
+              <a:t>8/1/13</a:t>
             </a:fld>
             <a:endParaRPr lang="en-US"/>
           </a:p>
@@ -911,7 +911,7 @@
           <a:p>
             <a:fld id="{C6F99218-CF29-4270-A98A-29700F174958}" type="datetimeFigureOut">
               <a:rPr lang="en-US" smtClean="0"/>
-              <a:t>7/30/2013</a:t>
+              <a:t>8/1/13</a:t>
             </a:fld>
             <a:endParaRPr lang="en-US"/>
           </a:p>
@@ -1091,7 +1091,7 @@
           <a:p>
             <a:fld id="{C6F99218-CF29-4270-A98A-29700F174958}" type="datetimeFigureOut">
               <a:rPr lang="en-US" smtClean="0"/>
-              <a:t>7/30/2013</a:t>
+              <a:t>8/1/13</a:t>
             </a:fld>
             <a:endParaRPr lang="en-US"/>
           </a:p>
@@ -1261,7 +1261,7 @@
           <a:p>
             <a:fld id="{C6F99218-CF29-4270-A98A-29700F174958}" type="datetimeFigureOut">
               <a:rPr lang="en-US" smtClean="0"/>
-              <a:t>7/30/2013</a:t>
+              <a:t>8/1/13</a:t>
             </a:fld>
             <a:endParaRPr lang="en-US"/>
           </a:p>
@@ -1507,7 +1507,7 @@
           <a:p>
             <a:fld id="{C6F99218-CF29-4270-A98A-29700F174958}" type="datetimeFigureOut">
               <a:rPr lang="en-US" smtClean="0"/>
-              <a:t>7/30/2013</a:t>
+              <a:t>8/1/13</a:t>
             </a:fld>
             <a:endParaRPr lang="en-US"/>
           </a:p>
@@ -1795,7 +1795,7 @@
           <a:p>
             <a:fld id="{C6F99218-CF29-4270-A98A-29700F174958}" type="datetimeFigureOut">
               <a:rPr lang="en-US" smtClean="0"/>
-              <a:t>7/30/2013</a:t>
+              <a:t>8/1/13</a:t>
             </a:fld>
             <a:endParaRPr lang="en-US"/>
           </a:p>
@@ -2217,7 +2217,7 @@
           <a:p>
             <a:fld id="{C6F99218-CF29-4270-A98A-29700F174958}" type="datetimeFigureOut">
               <a:rPr lang="en-US" smtClean="0"/>
-              <a:t>7/30/2013</a:t>
+              <a:t>8/1/13</a:t>
             </a:fld>
             <a:endParaRPr lang="en-US"/>
           </a:p>
@@ -2335,7 +2335,7 @@
           <a:p>
             <a:fld id="{C6F99218-CF29-4270-A98A-29700F174958}" type="datetimeFigureOut">
               <a:rPr lang="en-US" smtClean="0"/>
-              <a:t>7/30/2013</a:t>
+              <a:t>8/1/13</a:t>
             </a:fld>
             <a:endParaRPr lang="en-US"/>
           </a:p>
@@ -2430,7 +2430,7 @@
           <a:p>
             <a:fld id="{C6F99218-CF29-4270-A98A-29700F174958}" type="datetimeFigureOut">
               <a:rPr lang="en-US" smtClean="0"/>
-              <a:t>7/30/2013</a:t>
+              <a:t>8/1/13</a:t>
             </a:fld>
             <a:endParaRPr lang="en-US"/>
           </a:p>
@@ -2707,7 +2707,7 @@
           <a:p>
             <a:fld id="{C6F99218-CF29-4270-A98A-29700F174958}" type="datetimeFigureOut">
               <a:rPr lang="en-US" smtClean="0"/>
-              <a:t>7/30/2013</a:t>
+              <a:t>8/1/13</a:t>
             </a:fld>
             <a:endParaRPr lang="en-US"/>
           </a:p>
@@ -2960,7 +2960,7 @@
           <a:p>
             <a:fld id="{C6F99218-CF29-4270-A98A-29700F174958}" type="datetimeFigureOut">
               <a:rPr lang="en-US" smtClean="0"/>
-              <a:t>7/30/2013</a:t>
+              <a:t>8/1/13</a:t>
             </a:fld>
             <a:endParaRPr lang="en-US"/>
           </a:p>
@@ -3173,7 +3173,7 @@
           <a:p>
             <a:fld id="{C6F99218-CF29-4270-A98A-29700F174958}" type="datetimeFigureOut">
               <a:rPr lang="en-US" smtClean="0"/>
-              <a:t>7/30/2013</a:t>
+              <a:t>8/1/13</a:t>
             </a:fld>
             <a:endParaRPr lang="en-US"/>
           </a:p>
@@ -4013,88 +4013,6 @@
           </a:prstGeom>
         </p:spPr>
       </p:pic>
-      <p:pic>
-        <p:nvPicPr>
-          <p:cNvPr id="1026" name="Picture 2" descr="C:\Users\Marcia\Downloads\romneyEffectPlot.png"/>
-          <p:cNvPicPr>
-            <a:picLocks noChangeAspect="1" noChangeArrowheads="1"/>
-          </p:cNvPicPr>
-          <p:nvPr/>
-        </p:nvPicPr>
-        <p:blipFill>
-          <a:blip r:embed="rId7" cstate="print">
-            <a:extLst>
-              <a:ext uri="{28A0092B-C50C-407E-A947-70E740481C1C}">
-                <a14:useLocalDpi xmlns:a14="http://schemas.microsoft.com/office/drawing/2010/main" val="0"/>
-              </a:ext>
-            </a:extLst>
-          </a:blip>
-          <a:srcRect/>
-          <a:stretch>
-            <a:fillRect/>
-          </a:stretch>
-        </p:blipFill>
-        <p:spPr bwMode="auto">
-          <a:xfrm>
-            <a:off x="31654285" y="26102078"/>
-            <a:ext cx="4431413" cy="4049614"/>
-          </a:xfrm>
-          <a:prstGeom prst="rect">
-            <a:avLst/>
-          </a:prstGeom>
-          <a:noFill/>
-          <a:extLst>
-            <a:ext uri="{909E8E84-426E-40DD-AFC4-6F175D3DCCD1}">
-              <a14:hiddenFill xmlns:a14="http://schemas.microsoft.com/office/drawing/2010/main">
-                <a:solidFill>
-                  <a:srgbClr val="FFFFFF"/>
-                </a:solidFill>
-              </a14:hiddenFill>
-            </a:ext>
-          </a:extLst>
-        </p:spPr>
-      </p:pic>
-      <p:pic>
-        <p:nvPicPr>
-          <p:cNvPr id="1027" name="Picture 3" descr="C:\Users\Marcia\Downloads\obamaEffectPlot.png"/>
-          <p:cNvPicPr>
-            <a:picLocks noChangeAspect="1" noChangeArrowheads="1"/>
-          </p:cNvPicPr>
-          <p:nvPr/>
-        </p:nvPicPr>
-        <p:blipFill>
-          <a:blip r:embed="rId8" cstate="print">
-            <a:extLst>
-              <a:ext uri="{28A0092B-C50C-407E-A947-70E740481C1C}">
-                <a14:useLocalDpi xmlns:a14="http://schemas.microsoft.com/office/drawing/2010/main" val="0"/>
-              </a:ext>
-            </a:extLst>
-          </a:blip>
-          <a:srcRect/>
-          <a:stretch>
-            <a:fillRect/>
-          </a:stretch>
-        </p:blipFill>
-        <p:spPr bwMode="auto">
-          <a:xfrm>
-            <a:off x="20409276" y="26102078"/>
-            <a:ext cx="4459723" cy="4075485"/>
-          </a:xfrm>
-          <a:prstGeom prst="rect">
-            <a:avLst/>
-          </a:prstGeom>
-          <a:noFill/>
-          <a:extLst>
-            <a:ext uri="{909E8E84-426E-40DD-AFC4-6F175D3DCCD1}">
-              <a14:hiddenFill xmlns:a14="http://schemas.microsoft.com/office/drawing/2010/main">
-                <a:solidFill>
-                  <a:srgbClr val="FFFFFF"/>
-                </a:solidFill>
-              </a14:hiddenFill>
-            </a:ext>
-          </a:extLst>
-        </p:spPr>
-      </p:pic>
       <p:sp>
         <p:nvSpPr>
           <p:cNvPr id="3" name="Rectangle 2"/>
@@ -4148,7 +4066,7 @@
           <p:nvPr/>
         </p:nvPicPr>
         <p:blipFill>
-          <a:blip r:embed="rId9" cstate="print">
+          <a:blip r:embed="rId7" cstate="print">
             <a:extLst>
               <a:ext uri="{28A0092B-C50C-407E-A947-70E740481C1C}">
                 <a14:useLocalDpi xmlns:a14="http://schemas.microsoft.com/office/drawing/2010/main" val="0"/>
@@ -4374,7 +4292,7 @@
           <p:nvPr/>
         </p:nvPicPr>
         <p:blipFill>
-          <a:blip r:embed="rId10" cstate="print">
+          <a:blip r:embed="rId8" cstate="print">
             <a:extLst>
               <a:ext uri="{28A0092B-C50C-407E-A947-70E740481C1C}">
                 <a14:useLocalDpi xmlns:a14="http://schemas.microsoft.com/office/drawing/2010/main" val="0"/>
@@ -4404,7 +4322,7 @@
           <p:nvPr/>
         </p:nvPicPr>
         <p:blipFill>
-          <a:blip r:embed="rId11" cstate="print">
+          <a:blip r:embed="rId9" cstate="print">
             <a:extLst>
               <a:ext uri="{28A0092B-C50C-407E-A947-70E740481C1C}">
                 <a14:useLocalDpi xmlns:a14="http://schemas.microsoft.com/office/drawing/2010/main" val="0"/>
@@ -4502,16 +4420,7 @@
                 </a:solidFill>
                 <a:latin typeface="Rockwell" pitchFamily="18" charset="0"/>
               </a:rPr>
-              <a:t>Eric Hare, Andee Kaplan, Heike Hofmann, Dianne </a:t>
-            </a:r>
-            <a:r>
-              <a:rPr lang="en-US" sz="5400" dirty="0" smtClean="0">
-                <a:solidFill>
-                  <a:schemeClr val="bg1"/>
-                </a:solidFill>
-                <a:latin typeface="Rockwell" pitchFamily="18" charset="0"/>
-              </a:rPr>
-              <a:t>Cook</a:t>
+              <a:t>Eric Hare, Andee Kaplan, Heike Hofmann, Dianne Cook</a:t>
             </a:r>
           </a:p>
           <a:p>
@@ -4844,210 +4753,6 @@
       </p:sp>
       <p:sp>
         <p:nvSpPr>
-          <p:cNvPr id="6" name="TextBox 5"/>
-          <p:cNvSpPr txBox="1"/>
-          <p:nvPr/>
-        </p:nvSpPr>
-        <p:spPr>
-          <a:xfrm>
-            <a:off x="10821031" y="26180567"/>
-            <a:ext cx="6057152" cy="5632311"/>
-          </a:xfrm>
-          <a:prstGeom prst="rect">
-            <a:avLst/>
-          </a:prstGeom>
-          <a:noFill/>
-        </p:spPr>
-        <p:txBody>
-          <a:bodyPr wrap="square" rtlCol="0">
-            <a:spAutoFit/>
-          </a:bodyPr>
-          <a:lstStyle/>
-          <a:p>
-            <a:r>
-              <a:rPr lang="en-US" sz="3200" b="1" dirty="0" smtClean="0">
-                <a:solidFill>
-                  <a:srgbClr val="FF0000"/>
-                </a:solidFill>
-                <a:latin typeface="Rockwell" pitchFamily="18" charset="0"/>
-              </a:rPr>
-              <a:t>Ad</a:t>
-            </a:r>
-            <a:r>
-              <a:rPr lang="en-US" sz="3200" dirty="0" smtClean="0">
-                <a:solidFill>
-                  <a:srgbClr val="FF0000"/>
-                </a:solidFill>
-                <a:latin typeface="Rockwell" pitchFamily="18" charset="0"/>
-              </a:rPr>
-              <a:t> </a:t>
-            </a:r>
-            <a:r>
-              <a:rPr lang="en-US" sz="2400" dirty="0" smtClean="0">
-                <a:latin typeface="Rockwell" pitchFamily="18" charset="0"/>
-              </a:rPr>
-              <a:t>Advertisement </a:t>
-            </a:r>
-            <a:r>
-              <a:rPr lang="en-US" sz="2400" dirty="0">
-                <a:latin typeface="Rockwell" pitchFamily="18" charset="0"/>
-              </a:rPr>
-              <a:t>spending, including television, radio, and </a:t>
-            </a:r>
-            <a:r>
-              <a:rPr lang="en-US" sz="2400" dirty="0" smtClean="0">
-                <a:latin typeface="Rockwell" pitchFamily="18" charset="0"/>
-              </a:rPr>
-              <a:t>online</a:t>
-            </a:r>
-            <a:endParaRPr lang="en-US" sz="2400" dirty="0">
-              <a:latin typeface="Rockwell" pitchFamily="18" charset="0"/>
-            </a:endParaRPr>
-          </a:p>
-          <a:p>
-            <a:r>
-              <a:rPr lang="en-US" sz="3200" b="1" dirty="0">
-                <a:solidFill>
-                  <a:srgbClr val="0070C0"/>
-                </a:solidFill>
-                <a:latin typeface="Rockwell" pitchFamily="18" charset="0"/>
-              </a:rPr>
-              <a:t>Direct </a:t>
-            </a:r>
-            <a:r>
-              <a:rPr lang="en-US" sz="3200" b="1" dirty="0" smtClean="0">
-                <a:solidFill>
-                  <a:srgbClr val="0070C0"/>
-                </a:solidFill>
-                <a:latin typeface="Rockwell" pitchFamily="18" charset="0"/>
-              </a:rPr>
-              <a:t>Contact </a:t>
-            </a:r>
-            <a:r>
-              <a:rPr lang="en-US" sz="2400" dirty="0" smtClean="0">
-                <a:latin typeface="Rockwell" pitchFamily="18" charset="0"/>
-              </a:rPr>
-              <a:t>Direct </a:t>
-            </a:r>
-            <a:r>
-              <a:rPr lang="en-US" sz="2400" dirty="0">
-                <a:latin typeface="Rockwell" pitchFamily="18" charset="0"/>
-              </a:rPr>
-              <a:t>voter contact, such as </a:t>
-            </a:r>
-            <a:r>
-              <a:rPr lang="en-US" sz="2400" dirty="0" smtClean="0">
-                <a:latin typeface="Rockwell" pitchFamily="18" charset="0"/>
-              </a:rPr>
-              <a:t>canvassing</a:t>
-            </a:r>
-            <a:endParaRPr lang="en-US" sz="2400" dirty="0">
-              <a:latin typeface="Rockwell" pitchFamily="18" charset="0"/>
-            </a:endParaRPr>
-          </a:p>
-          <a:p>
-            <a:r>
-              <a:rPr lang="en-US" sz="3200" b="1" dirty="0">
-                <a:solidFill>
-                  <a:srgbClr val="00B050"/>
-                </a:solidFill>
-                <a:latin typeface="Rockwell" pitchFamily="18" charset="0"/>
-              </a:rPr>
-              <a:t>Overhead</a:t>
-            </a:r>
-            <a:r>
-              <a:rPr lang="en-US" sz="3200" dirty="0">
-                <a:solidFill>
-                  <a:srgbClr val="00B050"/>
-                </a:solidFill>
-                <a:latin typeface="Rockwell" pitchFamily="18" charset="0"/>
-              </a:rPr>
-              <a:t> </a:t>
-            </a:r>
-            <a:r>
-              <a:rPr lang="en-US" sz="2400" dirty="0">
-                <a:latin typeface="Rockwell" pitchFamily="18" charset="0"/>
-              </a:rPr>
-              <a:t>Expenditures related to the ongoing cost of running an Super PAC, including salary, rent, consultants, fundraising, and </a:t>
-            </a:r>
-            <a:r>
-              <a:rPr lang="en-US" sz="2400" dirty="0" smtClean="0">
-                <a:latin typeface="Rockwell" pitchFamily="18" charset="0"/>
-              </a:rPr>
-              <a:t>travel</a:t>
-            </a:r>
-            <a:endParaRPr lang="en-US" sz="2400" dirty="0">
-              <a:latin typeface="Rockwell" pitchFamily="18" charset="0"/>
-            </a:endParaRPr>
-          </a:p>
-          <a:p>
-            <a:r>
-              <a:rPr lang="en-US" sz="3200" b="1" dirty="0" smtClean="0">
-                <a:solidFill>
-                  <a:srgbClr val="7030A0"/>
-                </a:solidFill>
-                <a:latin typeface="Rockwell" pitchFamily="18" charset="0"/>
-              </a:rPr>
-              <a:t>Swag</a:t>
-            </a:r>
-            <a:r>
-              <a:rPr lang="en-US" sz="3200" dirty="0" smtClean="0">
-                <a:solidFill>
-                  <a:srgbClr val="7030A0"/>
-                </a:solidFill>
-                <a:latin typeface="Rockwell" pitchFamily="18" charset="0"/>
-              </a:rPr>
-              <a:t> </a:t>
-            </a:r>
-            <a:r>
-              <a:rPr lang="en-US" sz="2400" dirty="0">
-                <a:latin typeface="Rockwell" pitchFamily="18" charset="0"/>
-              </a:rPr>
-              <a:t>Clothing, signs, and other promotional </a:t>
-            </a:r>
-            <a:r>
-              <a:rPr lang="en-US" sz="2400" dirty="0" smtClean="0">
-                <a:latin typeface="Rockwell" pitchFamily="18" charset="0"/>
-              </a:rPr>
-              <a:t>material</a:t>
-            </a:r>
-            <a:endParaRPr lang="en-US" sz="3200" dirty="0">
-              <a:latin typeface="Rockwell" pitchFamily="18" charset="0"/>
-            </a:endParaRPr>
-          </a:p>
-          <a:p>
-            <a:r>
-              <a:rPr lang="en-US" sz="3200" b="1" dirty="0">
-                <a:solidFill>
-                  <a:srgbClr val="FF6600"/>
-                </a:solidFill>
-                <a:latin typeface="Rockwell" pitchFamily="18" charset="0"/>
-              </a:rPr>
-              <a:t>Other</a:t>
-            </a:r>
-            <a:r>
-              <a:rPr lang="en-US" sz="3200" dirty="0">
-                <a:solidFill>
-                  <a:srgbClr val="FF6600"/>
-                </a:solidFill>
-                <a:latin typeface="Rockwell" pitchFamily="18" charset="0"/>
-              </a:rPr>
-              <a:t> </a:t>
-            </a:r>
-            <a:r>
-              <a:rPr lang="en-US" sz="2400" dirty="0">
-                <a:latin typeface="Rockwell" pitchFamily="18" charset="0"/>
-              </a:rPr>
-              <a:t>All expenses that do not ﬁt into the above buckets</a:t>
-            </a:r>
-          </a:p>
-          <a:p>
-            <a:endParaRPr lang="en-US" sz="3200" dirty="0"/>
-          </a:p>
-        </p:txBody>
-      </p:sp>
-      <p:sp>
-        <p:nvSpPr>
           <p:cNvPr id="38" name="TextBox 37"/>
           <p:cNvSpPr txBox="1"/>
           <p:nvPr/>
@@ -5088,13 +4793,7 @@
               <a:rPr lang="en-US" sz="3200" dirty="0" smtClean="0">
                 <a:latin typeface="Rockwell" pitchFamily="18" charset="0"/>
               </a:rPr>
-              <a:t>The plot on the right displays </a:t>
-            </a:r>
-            <a:r>
-              <a:rPr lang="en-US" sz="3200" dirty="0" smtClean="0">
-                <a:latin typeface="Rockwell" pitchFamily="18" charset="0"/>
-              </a:rPr>
-              <a:t>polling </a:t>
+              <a:t>The plot on the right displays polling </a:t>
             </a:r>
             <a:r>
               <a:rPr lang="en-US" sz="3200" dirty="0">
@@ -5341,13 +5040,7 @@
               <a:rPr lang="en-US" sz="3200" dirty="0" smtClean="0">
                 <a:latin typeface="Rockwell" pitchFamily="18" charset="0"/>
               </a:rPr>
-              <a:t>It can be observed that the Romney-benefitting Super PACs maintained a consistently higher level of opposition advertisement spending, while the Obama-benefitting Super PACs tended to spend more on overhead and swag</a:t>
-            </a:r>
-            <a:r>
-              <a:rPr lang="en-US" sz="3200" dirty="0" smtClean="0">
-                <a:latin typeface="Rockwell" pitchFamily="18" charset="0"/>
-              </a:rPr>
-              <a:t>.</a:t>
+              <a:t>It can be observed that the Romney-benefitting Super PACs maintained a consistently higher level of opposition advertisement spending, while the Obama-benefitting Super PACs tended to spend more on overhead and swag.</a:t>
             </a:r>
             <a:endParaRPr lang="en-US" sz="3200" dirty="0">
               <a:latin typeface="Rockwell" pitchFamily="18" charset="0"/>
@@ -5408,7 +5101,7 @@
           <p:nvPr/>
         </p:nvPicPr>
         <p:blipFill>
-          <a:blip r:embed="rId12" cstate="print">
+          <a:blip r:embed="rId10" cstate="print">
             <a:extLst>
               <a:ext uri="{28A0092B-C50C-407E-A947-70E740481C1C}">
                 <a14:useLocalDpi xmlns:a14="http://schemas.microsoft.com/office/drawing/2010/main" val="0"/>
@@ -5471,29 +5164,8 @@
               <a:rPr lang="en-US" sz="3200" dirty="0" smtClean="0">
                 <a:latin typeface="Rockwell" pitchFamily="18" charset="0"/>
               </a:rPr>
-              <a:t>The left plot displays </a:t>
-            </a:r>
-            <a:r>
-              <a:rPr lang="en-US" sz="3200" dirty="0" smtClean="0">
-                <a:latin typeface="Rockwell" pitchFamily="18" charset="0"/>
-              </a:rPr>
-              <a:t>total weekly spending by Super PACs, on a log scale, benefitting each candidate.  The shaded region (1) indicates a period of lower spending by the Romney-benefitting Super </a:t>
-            </a:r>
-            <a:r>
-              <a:rPr lang="en-US" sz="3200" dirty="0" smtClean="0">
-                <a:latin typeface="Rockwell" pitchFamily="18" charset="0"/>
-              </a:rPr>
-              <a:t>PACs. Note </a:t>
-            </a:r>
-            <a:r>
-              <a:rPr lang="en-US" sz="3200" dirty="0" smtClean="0">
-                <a:latin typeface="Rockwell" pitchFamily="18" charset="0"/>
-              </a:rPr>
-              <a:t>the Obama-benefitting Super PACs’ relatively steady spending throughout both the early shaded and later non-shaded region.  </a:t>
-            </a:r>
-            <a:endParaRPr lang="en-US" sz="3200" dirty="0" smtClean="0">
-              <a:latin typeface="Rockwell" pitchFamily="18" charset="0"/>
-            </a:endParaRPr>
+              <a:t>The left plot displays total weekly spending by Super PACs, on a log scale, benefitting each candidate.  The shaded region (1) indicates a period of lower spending by the Romney-benefitting Super PACs. Note the Obama-benefitting Super PACs’ relatively steady spending throughout both the early shaded and later non-shaded region.  </a:t>
+            </a:r>
           </a:p>
           <a:p>
             <a:endParaRPr lang="en-US" sz="1400" dirty="0">
@@ -5549,9 +5221,6 @@
               </a:rPr>
               <a:t>candidate.</a:t>
             </a:r>
-            <a:endParaRPr lang="en-US" sz="3200" dirty="0">
-              <a:latin typeface="Rockwell" pitchFamily="18" charset="0"/>
-            </a:endParaRPr>
           </a:p>
         </p:txBody>
       </p:sp>
@@ -6247,7 +5916,7 @@
   <p:timing>
     <p:tnLst>
       <p:par>
-        <p:cTn id="1" dur="indefinite" restart="never" nodeType="tmRoot"/>
+        <p:cTn xmlns:p14="http://schemas.microsoft.com/office/powerpoint/2010/main" id="1" dur="indefinite" restart="never" nodeType="tmRoot"/>
       </p:par>
     </p:tnLst>
   </p:timing>

</xml_diff>

<commit_message>
Update the conclusion in the poster
</commit_message>
<xml_diff>
--- a/Poster/Election2012Poster.pptx
+++ b/Poster/Election2012Poster.pptx
@@ -109,7 +109,7 @@
   </p:defaultTextStyle>
   <p:extLst>
     <p:ext uri="{EFAFB233-063F-42B5-8137-9DF3F51BA10A}">
-      <p15:sldGuideLst xmlns="" xmlns:p15="http://schemas.microsoft.com/office/powerpoint/2012/main">
+      <p15:sldGuideLst xmlns:p15="http://schemas.microsoft.com/office/powerpoint/2012/main" xmlns="">
         <p15:guide id="1" orient="horz" pos="8064">
           <p15:clr>
             <a:srgbClr val="A4A3A4"/>
@@ -4352,7 +4352,7 @@
         <p:spPr>
           <a:xfrm flipH="1">
             <a:off x="38782752" y="20190861"/>
-            <a:ext cx="11521440" cy="3046988"/>
+            <a:ext cx="11521440" cy="5016757"/>
           </a:xfrm>
           <a:prstGeom prst="rect">
             <a:avLst/>
@@ -4385,8 +4385,35 @@
               <a:rPr lang="en-US" sz="3200" dirty="0">
                 <a:latin typeface="Rockwell" pitchFamily="18" charset="0"/>
               </a:rPr>
-              <a:t>is not clear whether the existence of Super PACs had a measurable impact on the outcome of the presidential race. Instead, the events that garnered large amounts of media coverage, such as the 47% video and the ﬁrst presidential debate, seem to have had the most noticeable eﬀect on the polling.</a:t>
-            </a:r>
+              <a:t>is not clear whether the existence of Super PACs had a measurable impact on the outcome of the presidential race. Instead, the events that garnered large amounts of media coverage, such as the 47% video and the ﬁrst presidential debate, seem to have had the most noticeable eﬀect on the polling</a:t>
+            </a:r>
+            <a:r>
+              <a:rPr lang="en-US" sz="3200" dirty="0" smtClean="0">
+                <a:latin typeface="Rockwell" pitchFamily="18" charset="0"/>
+              </a:rPr>
+              <a:t>.  </a:t>
+            </a:r>
+            <a:r>
+              <a:rPr lang="en-US" sz="3200" dirty="0" smtClean="0">
+                <a:latin typeface="Rockwell" pitchFamily="18" charset="0"/>
+              </a:rPr>
+              <a:t>Still, the relatively lesser spending by Romney-benefitting Super PACs early in the campaign may have allowed the Obama campaign to establish an advantage that </a:t>
+            </a:r>
+            <a:r>
+              <a:rPr lang="en-US" sz="3200" dirty="0" err="1" smtClean="0">
+                <a:latin typeface="Rockwell" pitchFamily="18" charset="0"/>
+              </a:rPr>
+              <a:t>ulimtately</a:t>
+            </a:r>
+            <a:r>
+              <a:rPr lang="en-US" sz="3200" dirty="0" smtClean="0">
+                <a:latin typeface="Rockwell" pitchFamily="18" charset="0"/>
+              </a:rPr>
+              <a:t> proved difficult to overcome.</a:t>
+            </a:r>
+            <a:endParaRPr lang="en-US" sz="3200" dirty="0">
+              <a:latin typeface="Rockwell" pitchFamily="18" charset="0"/>
+            </a:endParaRPr>
           </a:p>
         </p:txBody>
       </p:sp>
@@ -5864,6 +5891,9 @@
               </a:rPr>
               <a:t>R</a:t>
             </a:r>
+            <a:endParaRPr lang="en-US" sz="3200" dirty="0" smtClean="0">
+              <a:latin typeface="Rockwell" pitchFamily="18" charset="0"/>
+            </a:endParaRPr>
           </a:p>
           <a:p>
             <a:pPr algn="just"/>

</xml_diff>

<commit_message>
Update bucket plots to be in the correct order
</commit_message>
<xml_diff>
--- a/Poster/Election2012Poster.pptx
+++ b/Poster/Election2012Poster.pptx
@@ -109,7 +109,7 @@
   </p:defaultTextStyle>
   <p:extLst>
     <p:ext uri="{EFAFB233-063F-42B5-8137-9DF3F51BA10A}">
-      <p15:sldGuideLst xmlns="" xmlns:p15="http://schemas.microsoft.com/office/powerpoint/2012/main">
+      <p15:sldGuideLst xmlns:p15="http://schemas.microsoft.com/office/powerpoint/2012/main" xmlns="">
         <p15:guide id="1" orient="horz" pos="8064">
           <p15:clr>
             <a:srgbClr val="A4A3A4"/>
@@ -208,7 +208,7 @@
           <a:p>
             <a:fld id="{E3864992-0E3E-4687-ABD4-3B2927D0EAC5}" type="datetimeFigureOut">
               <a:rPr lang="en-US" smtClean="0"/>
-              <a:t>8/2/2013</a:t>
+              <a:t>8/2/13</a:t>
             </a:fld>
             <a:endParaRPr lang="en-US"/>
           </a:p>
@@ -741,7 +741,7 @@
           <a:p>
             <a:fld id="{C6F99218-CF29-4270-A98A-29700F174958}" type="datetimeFigureOut">
               <a:rPr lang="en-US" smtClean="0"/>
-              <a:t>8/2/2013</a:t>
+              <a:t>8/2/13</a:t>
             </a:fld>
             <a:endParaRPr lang="en-US"/>
           </a:p>
@@ -911,7 +911,7 @@
           <a:p>
             <a:fld id="{C6F99218-CF29-4270-A98A-29700F174958}" type="datetimeFigureOut">
               <a:rPr lang="en-US" smtClean="0"/>
-              <a:t>8/2/2013</a:t>
+              <a:t>8/2/13</a:t>
             </a:fld>
             <a:endParaRPr lang="en-US"/>
           </a:p>
@@ -1091,7 +1091,7 @@
           <a:p>
             <a:fld id="{C6F99218-CF29-4270-A98A-29700F174958}" type="datetimeFigureOut">
               <a:rPr lang="en-US" smtClean="0"/>
-              <a:t>8/2/2013</a:t>
+              <a:t>8/2/13</a:t>
             </a:fld>
             <a:endParaRPr lang="en-US"/>
           </a:p>
@@ -1261,7 +1261,7 @@
           <a:p>
             <a:fld id="{C6F99218-CF29-4270-A98A-29700F174958}" type="datetimeFigureOut">
               <a:rPr lang="en-US" smtClean="0"/>
-              <a:t>8/2/2013</a:t>
+              <a:t>8/2/13</a:t>
             </a:fld>
             <a:endParaRPr lang="en-US"/>
           </a:p>
@@ -1507,7 +1507,7 @@
           <a:p>
             <a:fld id="{C6F99218-CF29-4270-A98A-29700F174958}" type="datetimeFigureOut">
               <a:rPr lang="en-US" smtClean="0"/>
-              <a:t>8/2/2013</a:t>
+              <a:t>8/2/13</a:t>
             </a:fld>
             <a:endParaRPr lang="en-US"/>
           </a:p>
@@ -1795,7 +1795,7 @@
           <a:p>
             <a:fld id="{C6F99218-CF29-4270-A98A-29700F174958}" type="datetimeFigureOut">
               <a:rPr lang="en-US" smtClean="0"/>
-              <a:t>8/2/2013</a:t>
+              <a:t>8/2/13</a:t>
             </a:fld>
             <a:endParaRPr lang="en-US"/>
           </a:p>
@@ -2217,7 +2217,7 @@
           <a:p>
             <a:fld id="{C6F99218-CF29-4270-A98A-29700F174958}" type="datetimeFigureOut">
               <a:rPr lang="en-US" smtClean="0"/>
-              <a:t>8/2/2013</a:t>
+              <a:t>8/2/13</a:t>
             </a:fld>
             <a:endParaRPr lang="en-US"/>
           </a:p>
@@ -2335,7 +2335,7 @@
           <a:p>
             <a:fld id="{C6F99218-CF29-4270-A98A-29700F174958}" type="datetimeFigureOut">
               <a:rPr lang="en-US" smtClean="0"/>
-              <a:t>8/2/2013</a:t>
+              <a:t>8/2/13</a:t>
             </a:fld>
             <a:endParaRPr lang="en-US"/>
           </a:p>
@@ -2430,7 +2430,7 @@
           <a:p>
             <a:fld id="{C6F99218-CF29-4270-A98A-29700F174958}" type="datetimeFigureOut">
               <a:rPr lang="en-US" smtClean="0"/>
-              <a:t>8/2/2013</a:t>
+              <a:t>8/2/13</a:t>
             </a:fld>
             <a:endParaRPr lang="en-US"/>
           </a:p>
@@ -2707,7 +2707,7 @@
           <a:p>
             <a:fld id="{C6F99218-CF29-4270-A98A-29700F174958}" type="datetimeFigureOut">
               <a:rPr lang="en-US" smtClean="0"/>
-              <a:t>8/2/2013</a:t>
+              <a:t>8/2/13</a:t>
             </a:fld>
             <a:endParaRPr lang="en-US"/>
           </a:p>
@@ -2960,7 +2960,7 @@
           <a:p>
             <a:fld id="{C6F99218-CF29-4270-A98A-29700F174958}" type="datetimeFigureOut">
               <a:rPr lang="en-US" smtClean="0"/>
-              <a:t>8/2/2013</a:t>
+              <a:t>8/2/13</a:t>
             </a:fld>
             <a:endParaRPr lang="en-US"/>
           </a:p>
@@ -3173,7 +3173,7 @@
           <a:p>
             <a:fld id="{C6F99218-CF29-4270-A98A-29700F174958}" type="datetimeFigureOut">
               <a:rPr lang="en-US" smtClean="0"/>
-              <a:t>8/2/2013</a:t>
+              <a:t>8/2/13</a:t>
             </a:fld>
             <a:endParaRPr lang="en-US"/>
           </a:p>
@@ -4095,7 +4095,7 @@
         </p:nvSpPr>
         <p:spPr>
           <a:xfrm>
-            <a:off x="1004512" y="9473265"/>
+            <a:off x="1066800" y="9372600"/>
             <a:ext cx="3717684" cy="830997"/>
           </a:xfrm>
           <a:prstGeom prst="rect">
@@ -4135,7 +4135,7 @@
         </p:nvSpPr>
         <p:spPr>
           <a:xfrm>
-            <a:off x="6998792" y="10111758"/>
+            <a:off x="6858000" y="9829800"/>
             <a:ext cx="5373841" cy="3539430"/>
           </a:xfrm>
           <a:prstGeom prst="rect">
@@ -4255,7 +4255,7 @@
         <p:spPr>
           <a:xfrm>
             <a:off x="1004512" y="14842613"/>
-            <a:ext cx="11870428" cy="1077218"/>
+            <a:ext cx="11416088" cy="1077218"/>
           </a:xfrm>
           <a:prstGeom prst="rect">
             <a:avLst/>
@@ -4283,66 +4283,6 @@
           </a:p>
         </p:txBody>
       </p:sp>
-      <p:pic>
-        <p:nvPicPr>
-          <p:cNvPr id="18" name="Picture 17"/>
-          <p:cNvPicPr>
-            <a:picLocks noChangeAspect="1"/>
-          </p:cNvPicPr>
-          <p:nvPr/>
-        </p:nvPicPr>
-        <p:blipFill>
-          <a:blip r:embed="rId8" cstate="print">
-            <a:extLst>
-              <a:ext uri="{28A0092B-C50C-407E-A947-70E740481C1C}">
-                <a14:useLocalDpi xmlns:a14="http://schemas.microsoft.com/office/drawing/2010/main" val="0"/>
-              </a:ext>
-            </a:extLst>
-          </a:blip>
-          <a:stretch>
-            <a:fillRect/>
-          </a:stretch>
-        </p:blipFill>
-        <p:spPr>
-          <a:xfrm>
-            <a:off x="8995186" y="19173736"/>
-            <a:ext cx="2802954" cy="2437352"/>
-          </a:xfrm>
-          <a:prstGeom prst="rect">
-            <a:avLst/>
-          </a:prstGeom>
-        </p:spPr>
-      </p:pic>
-      <p:pic>
-        <p:nvPicPr>
-          <p:cNvPr id="19" name="Picture 18"/>
-          <p:cNvPicPr>
-            <a:picLocks noChangeAspect="1"/>
-          </p:cNvPicPr>
-          <p:nvPr/>
-        </p:nvPicPr>
-        <p:blipFill>
-          <a:blip r:embed="rId9" cstate="print">
-            <a:extLst>
-              <a:ext uri="{28A0092B-C50C-407E-A947-70E740481C1C}">
-                <a14:useLocalDpi xmlns:a14="http://schemas.microsoft.com/office/drawing/2010/main" val="0"/>
-              </a:ext>
-            </a:extLst>
-          </a:blip>
-          <a:stretch>
-            <a:fillRect/>
-          </a:stretch>
-        </p:blipFill>
-        <p:spPr>
-          <a:xfrm>
-            <a:off x="8995186" y="16566660"/>
-            <a:ext cx="2802954" cy="2437352"/>
-          </a:xfrm>
-          <a:prstGeom prst="rect">
-            <a:avLst/>
-          </a:prstGeom>
-        </p:spPr>
-      </p:pic>
       <p:sp>
         <p:nvSpPr>
           <p:cNvPr id="11" name="TextBox 10"/>
@@ -4373,12 +4313,18 @@
               <a:rPr lang="en-US" sz="3200" dirty="0">
                 <a:latin typeface="Rockwell" pitchFamily="18" charset="0"/>
               </a:rPr>
-              <a:t>Ultimately, our ﬁndings </a:t>
+              <a:t>Ultimately, our </a:t>
             </a:r>
             <a:r>
               <a:rPr lang="en-US" sz="3200" dirty="0" smtClean="0">
                 <a:latin typeface="Rockwell" pitchFamily="18" charset="0"/>
               </a:rPr>
+              <a:t>findings </a:t>
+            </a:r>
+            <a:r>
+              <a:rPr lang="en-US" sz="3200" dirty="0" smtClean="0">
+                <a:latin typeface="Rockwell" pitchFamily="18" charset="0"/>
+              </a:rPr>
               <a:t>suggest that it </a:t>
             </a:r>
             <a:r>
@@ -4391,19 +4337,7 @@
               <a:rPr lang="en-US" sz="3200" dirty="0" smtClean="0">
                 <a:latin typeface="Rockwell" pitchFamily="18" charset="0"/>
               </a:rPr>
-              <a:t>.  Still, the relatively lesser spending by Romney-benefitting Super PACs early in the campaign may have allowed the Obama campaign to establish an advantage that </a:t>
-            </a:r>
-            <a:r>
-              <a:rPr lang="en-US" sz="3200" dirty="0" smtClean="0">
-                <a:latin typeface="Rockwell" pitchFamily="18" charset="0"/>
-              </a:rPr>
-              <a:t>ultimately </a:t>
-            </a:r>
-            <a:r>
-              <a:rPr lang="en-US" sz="3200" dirty="0" smtClean="0">
-                <a:latin typeface="Rockwell" pitchFamily="18" charset="0"/>
-              </a:rPr>
-              <a:t>proved difficult to overcome.</a:t>
+              <a:t>.  Still, the relatively lesser spending by Romney-benefitting Super PACs early in the campaign may have allowed the Obama campaign to establish an advantage that ultimately proved difficult to overcome.</a:t>
             </a:r>
             <a:endParaRPr lang="en-US" sz="3200" dirty="0">
               <a:latin typeface="Rockwell" pitchFamily="18" charset="0"/>
@@ -4978,14 +4912,17 @@
               <a:rPr lang="en-US" sz="3200" dirty="0">
                 <a:latin typeface="Rockwell" pitchFamily="18" charset="0"/>
               </a:rPr>
-              <a:t>) election day</a:t>
+              <a:t>) election </a:t>
             </a:r>
             <a:r>
               <a:rPr lang="en-US" sz="3200" dirty="0" smtClean="0">
                 <a:latin typeface="Rockwell" pitchFamily="18" charset="0"/>
               </a:rPr>
-              <a:t>.</a:t>
-            </a:r>
+              <a:t>day</a:t>
+            </a:r>
+            <a:endParaRPr lang="en-US" sz="3200" dirty="0" smtClean="0">
+              <a:latin typeface="Rockwell" pitchFamily="18" charset="0"/>
+            </a:endParaRPr>
           </a:p>
           <a:p>
             <a:endParaRPr lang="en-US" sz="3200" dirty="0">
@@ -5122,7 +5059,7 @@
           <p:nvPr/>
         </p:nvPicPr>
         <p:blipFill>
-          <a:blip r:embed="rId10" cstate="print">
+          <a:blip r:embed="rId8" cstate="print">
             <a:extLst>
               <a:ext uri="{28A0092B-C50C-407E-A947-70E740481C1C}">
                 <a14:useLocalDpi xmlns:a14="http://schemas.microsoft.com/office/drawing/2010/main" val="0"/>
@@ -5318,7 +5255,25 @@
               <a:rPr lang="en-US" sz="3200" dirty="0">
                 <a:latin typeface="Rockwell" pitchFamily="18" charset="0"/>
               </a:rPr>
-              <a:t>does not seem that this spending increase had a measurable eﬀect on the overall trend in the polls at this time.</a:t>
+              <a:t>does not seem that this spending increase had a measurable </a:t>
+            </a:r>
+            <a:r>
+              <a:rPr lang="en-US" sz="3200" dirty="0" smtClean="0">
+                <a:latin typeface="Rockwell" pitchFamily="18" charset="0"/>
+              </a:rPr>
+              <a:t>eff</a:t>
+            </a:r>
+            <a:r>
+              <a:rPr lang="en-US" sz="3200" dirty="0" smtClean="0">
+                <a:latin typeface="Rockwell" pitchFamily="18" charset="0"/>
+              </a:rPr>
+              <a:t>ect </a:t>
+            </a:r>
+            <a:r>
+              <a:rPr lang="en-US" sz="3200" dirty="0">
+                <a:latin typeface="Rockwell" pitchFamily="18" charset="0"/>
+              </a:rPr>
+              <a:t>on the overall trend in the polls at this time.</a:t>
             </a:r>
           </a:p>
         </p:txBody>
@@ -5332,7 +5287,7 @@
           <p:nvPr>
             <p:extLst>
               <p:ext uri="{D42A27DB-BD31-4B8C-83A1-F6EECF244321}">
-                <p14:modId xmlns:p14="http://schemas.microsoft.com/office/powerpoint/2010/main" val="1855251361"/>
+                <p14:modId xmlns:p14="http://schemas.microsoft.com/office/powerpoint/2010/main" val="1667836441"/>
               </p:ext>
             </p:extLst>
           </p:nvPr>
@@ -5543,7 +5498,7 @@
                             <a:noFill/>
                           </a:ln>
                           <a:solidFill>
-                            <a:srgbClr val="00B050"/>
+                            <a:srgbClr val="7C007C"/>
                           </a:solidFill>
                           <a:effectLst/>
                           <a:uLnTx/>
@@ -5554,7 +5509,11 @@
                         </a:rPr>
                         <a:t>Overhead</a:t>
                       </a:r>
-                      <a:endParaRPr lang="en-US" sz="2400" dirty="0"/>
+                      <a:endParaRPr lang="en-US" sz="2400" dirty="0">
+                        <a:solidFill>
+                          <a:srgbClr val="7C007C"/>
+                        </a:solidFill>
+                      </a:endParaRPr>
                     </a:p>
                   </a:txBody>
                   <a:tcPr/>
@@ -5615,7 +5574,7 @@
                             <a:noFill/>
                           </a:ln>
                           <a:solidFill>
-                            <a:srgbClr val="7030A0"/>
+                            <a:srgbClr val="FF6600"/>
                           </a:solidFill>
                           <a:effectLst/>
                           <a:uLnTx/>
@@ -5632,7 +5591,7 @@
                             <a:noFill/>
                           </a:ln>
                           <a:solidFill>
-                            <a:srgbClr val="7030A0"/>
+                            <a:srgbClr val="FF6600"/>
                           </a:solidFill>
                           <a:effectLst/>
                           <a:uLnTx/>
@@ -5643,7 +5602,11 @@
                         </a:rPr>
                         <a:t> </a:t>
                       </a:r>
-                      <a:endParaRPr lang="en-US" sz="2400" dirty="0"/>
+                      <a:endParaRPr lang="en-US" sz="2400" dirty="0">
+                        <a:solidFill>
+                          <a:srgbClr val="FF6600"/>
+                        </a:solidFill>
+                      </a:endParaRPr>
                     </a:p>
                   </a:txBody>
                   <a:tcPr/>
@@ -5718,7 +5681,7 @@
                             <a:noFill/>
                           </a:ln>
                           <a:solidFill>
-                            <a:srgbClr val="FF6600"/>
+                            <a:srgbClr val="008000"/>
                           </a:solidFill>
                           <a:effectLst/>
                           <a:uLnTx/>
@@ -5735,7 +5698,7 @@
                             <a:noFill/>
                           </a:ln>
                           <a:solidFill>
-                            <a:srgbClr val="FF6600"/>
+                            <a:srgbClr val="008000"/>
                           </a:solidFill>
                           <a:effectLst/>
                           <a:uLnTx/>
@@ -5746,7 +5709,11 @@
                         </a:rPr>
                         <a:t> </a:t>
                       </a:r>
-                      <a:endParaRPr lang="en-US" sz="2400" dirty="0"/>
+                      <a:endParaRPr lang="en-US" sz="2400" dirty="0">
+                        <a:solidFill>
+                          <a:srgbClr val="008000"/>
+                        </a:solidFill>
+                      </a:endParaRPr>
                     </a:p>
                   </a:txBody>
                   <a:tcPr/>
@@ -5924,6 +5891,66 @@
           </a:p>
         </p:txBody>
       </p:sp>
+      <p:pic>
+        <p:nvPicPr>
+          <p:cNvPr id="6" name="Picture 5" descr="bucketPlotCount.png"/>
+          <p:cNvPicPr>
+            <a:picLocks noChangeAspect="1"/>
+          </p:cNvPicPr>
+          <p:nvPr/>
+        </p:nvPicPr>
+        <p:blipFill>
+          <a:blip r:embed="rId9">
+            <a:extLst>
+              <a:ext uri="{28A0092B-C50C-407E-A947-70E740481C1C}">
+                <a14:useLocalDpi xmlns:a14="http://schemas.microsoft.com/office/drawing/2010/main" val="0"/>
+              </a:ext>
+            </a:extLst>
+          </a:blip>
+          <a:stretch>
+            <a:fillRect/>
+          </a:stretch>
+        </p:blipFill>
+        <p:spPr>
+          <a:xfrm>
+            <a:off x="9067800" y="15925800"/>
+            <a:ext cx="2667000" cy="2848497"/>
+          </a:xfrm>
+          <a:prstGeom prst="rect">
+            <a:avLst/>
+          </a:prstGeom>
+        </p:spPr>
+      </p:pic>
+      <p:pic>
+        <p:nvPicPr>
+          <p:cNvPr id="7" name="Picture 6" descr="bucketPlotSum.png"/>
+          <p:cNvPicPr>
+            <a:picLocks noChangeAspect="1"/>
+          </p:cNvPicPr>
+          <p:nvPr/>
+        </p:nvPicPr>
+        <p:blipFill>
+          <a:blip r:embed="rId10">
+            <a:extLst>
+              <a:ext uri="{28A0092B-C50C-407E-A947-70E740481C1C}">
+                <a14:useLocalDpi xmlns:a14="http://schemas.microsoft.com/office/drawing/2010/main" val="0"/>
+              </a:ext>
+            </a:extLst>
+          </a:blip>
+          <a:stretch>
+            <a:fillRect/>
+          </a:stretch>
+        </p:blipFill>
+        <p:spPr>
+          <a:xfrm>
+            <a:off x="9067800" y="18897600"/>
+            <a:ext cx="2667000" cy="2848498"/>
+          </a:xfrm>
+          <a:prstGeom prst="rect">
+            <a:avLst/>
+          </a:prstGeom>
+        </p:spPr>
+      </p:pic>
     </p:spTree>
     <p:extLst>
       <p:ext uri="{BB962C8B-B14F-4D97-AF65-F5344CB8AC3E}">
@@ -5937,7 +5964,7 @@
   <p:timing>
     <p:tnLst>
       <p:par>
-        <p:cTn id="1" dur="indefinite" restart="never" nodeType="tmRoot"/>
+        <p:cTn xmlns:p14="http://schemas.microsoft.com/office/powerpoint/2010/main" id="1" dur="indefinite" restart="never" nodeType="tmRoot"/>
       </p:par>
     </p:tnLst>
   </p:timing>

</xml_diff>